<commit_message>
Presentation is ready. Almost :)
</commit_message>
<xml_diff>
--- a/valt_presentation/valt_thesis.pptx
+++ b/valt_presentation/valt_thesis.pptx
@@ -9,12 +9,31 @@
     <p:sldId id="258" r:id="rId3"/>
     <p:sldId id="260" r:id="rId4"/>
     <p:sldId id="261" r:id="rId5"/>
-    <p:sldId id="259" r:id="rId6"/>
-    <p:sldId id="265" r:id="rId7"/>
-    <p:sldId id="264" r:id="rId8"/>
-    <p:sldId id="263" r:id="rId9"/>
-    <p:sldId id="262" r:id="rId10"/>
-    <p:sldId id="257" r:id="rId11"/>
+    <p:sldId id="265" r:id="rId6"/>
+    <p:sldId id="267" r:id="rId7"/>
+    <p:sldId id="259" r:id="rId8"/>
+    <p:sldId id="266" r:id="rId9"/>
+    <p:sldId id="271" r:id="rId10"/>
+    <p:sldId id="268" r:id="rId11"/>
+    <p:sldId id="269" r:id="rId12"/>
+    <p:sldId id="273" r:id="rId13"/>
+    <p:sldId id="270" r:id="rId14"/>
+    <p:sldId id="264" r:id="rId15"/>
+    <p:sldId id="274" r:id="rId16"/>
+    <p:sldId id="277" r:id="rId17"/>
+    <p:sldId id="275" r:id="rId18"/>
+    <p:sldId id="278" r:id="rId19"/>
+    <p:sldId id="276" r:id="rId20"/>
+    <p:sldId id="279" r:id="rId21"/>
+    <p:sldId id="280" r:id="rId22"/>
+    <p:sldId id="281" r:id="rId23"/>
+    <p:sldId id="282" r:id="rId24"/>
+    <p:sldId id="283" r:id="rId25"/>
+    <p:sldId id="284" r:id="rId26"/>
+    <p:sldId id="285" r:id="rId27"/>
+    <p:sldId id="263" r:id="rId28"/>
+    <p:sldId id="262" r:id="rId29"/>
+    <p:sldId id="286" r:id="rId30"/>
   </p:sldIdLst>
   <p:sldSz cx="9144000" cy="6858000" type="screen4x3"/>
   <p:notesSz cx="6858000" cy="9144000"/>
@@ -297,7 +316,7 @@
           <a:p>
             <a:fld id="{7A48B505-B867-3040-917A-6E8E7A35FA20}" type="datetimeFigureOut">
               <a:rPr lang="ru-RU" smtClean="0"/>
-              <a:t>6/5/16</a:t>
+              <a:t>6/6/16</a:t>
             </a:fld>
             <a:endParaRPr lang="ru-RU"/>
           </a:p>
@@ -467,7 +486,7 @@
           <a:p>
             <a:fld id="{7A48B505-B867-3040-917A-6E8E7A35FA20}" type="datetimeFigureOut">
               <a:rPr lang="ru-RU" smtClean="0"/>
-              <a:t>6/5/16</a:t>
+              <a:t>6/6/16</a:t>
             </a:fld>
             <a:endParaRPr lang="ru-RU"/>
           </a:p>
@@ -647,7 +666,7 @@
           <a:p>
             <a:fld id="{7A48B505-B867-3040-917A-6E8E7A35FA20}" type="datetimeFigureOut">
               <a:rPr lang="ru-RU" smtClean="0"/>
-              <a:t>6/5/16</a:t>
+              <a:t>6/6/16</a:t>
             </a:fld>
             <a:endParaRPr lang="ru-RU"/>
           </a:p>
@@ -817,7 +836,7 @@
           <a:p>
             <a:fld id="{7A48B505-B867-3040-917A-6E8E7A35FA20}" type="datetimeFigureOut">
               <a:rPr lang="ru-RU" smtClean="0"/>
-              <a:t>6/5/16</a:t>
+              <a:t>6/6/16</a:t>
             </a:fld>
             <a:endParaRPr lang="ru-RU"/>
           </a:p>
@@ -1063,7 +1082,7 @@
           <a:p>
             <a:fld id="{7A48B505-B867-3040-917A-6E8E7A35FA20}" type="datetimeFigureOut">
               <a:rPr lang="ru-RU" smtClean="0"/>
-              <a:t>6/5/16</a:t>
+              <a:t>6/6/16</a:t>
             </a:fld>
             <a:endParaRPr lang="ru-RU"/>
           </a:p>
@@ -1351,7 +1370,7 @@
           <a:p>
             <a:fld id="{7A48B505-B867-3040-917A-6E8E7A35FA20}" type="datetimeFigureOut">
               <a:rPr lang="ru-RU" smtClean="0"/>
-              <a:t>6/5/16</a:t>
+              <a:t>6/6/16</a:t>
             </a:fld>
             <a:endParaRPr lang="ru-RU"/>
           </a:p>
@@ -1773,7 +1792,7 @@
           <a:p>
             <a:fld id="{7A48B505-B867-3040-917A-6E8E7A35FA20}" type="datetimeFigureOut">
               <a:rPr lang="ru-RU" smtClean="0"/>
-              <a:t>6/5/16</a:t>
+              <a:t>6/6/16</a:t>
             </a:fld>
             <a:endParaRPr lang="ru-RU"/>
           </a:p>
@@ -1891,7 +1910,7 @@
           <a:p>
             <a:fld id="{7A48B505-B867-3040-917A-6E8E7A35FA20}" type="datetimeFigureOut">
               <a:rPr lang="ru-RU" smtClean="0"/>
-              <a:t>6/5/16</a:t>
+              <a:t>6/6/16</a:t>
             </a:fld>
             <a:endParaRPr lang="ru-RU"/>
           </a:p>
@@ -1986,7 +2005,7 @@
           <a:p>
             <a:fld id="{7A48B505-B867-3040-917A-6E8E7A35FA20}" type="datetimeFigureOut">
               <a:rPr lang="ru-RU" smtClean="0"/>
-              <a:t>6/5/16</a:t>
+              <a:t>6/6/16</a:t>
             </a:fld>
             <a:endParaRPr lang="ru-RU"/>
           </a:p>
@@ -2263,7 +2282,7 @@
           <a:p>
             <a:fld id="{7A48B505-B867-3040-917A-6E8E7A35FA20}" type="datetimeFigureOut">
               <a:rPr lang="ru-RU" smtClean="0"/>
-              <a:t>6/5/16</a:t>
+              <a:t>6/6/16</a:t>
             </a:fld>
             <a:endParaRPr lang="ru-RU"/>
           </a:p>
@@ -2516,7 +2535,7 @@
           <a:p>
             <a:fld id="{7A48B505-B867-3040-917A-6E8E7A35FA20}" type="datetimeFigureOut">
               <a:rPr lang="ru-RU" smtClean="0"/>
-              <a:t>6/5/16</a:t>
+              <a:t>6/6/16</a:t>
             </a:fld>
             <a:endParaRPr lang="ru-RU"/>
           </a:p>
@@ -2729,7 +2748,7 @@
           <a:p>
             <a:fld id="{7A48B505-B867-3040-917A-6E8E7A35FA20}" type="datetimeFigureOut">
               <a:rPr lang="ru-RU" smtClean="0"/>
-              <a:t>6/5/16</a:t>
+              <a:t>6/6/16</a:t>
             </a:fld>
             <a:endParaRPr lang="ru-RU"/>
           </a:p>
@@ -3152,7 +3171,7 @@
         </p:spPr>
         <p:txBody>
           <a:bodyPr>
-            <a:normAutofit fontScale="77500" lnSpcReduction="20000"/>
+            <a:normAutofit fontScale="70000" lnSpcReduction="20000"/>
           </a:bodyPr>
           <a:lstStyle/>
           <a:p>
@@ -3163,9 +3182,16 @@
             <a:br>
               <a:rPr lang="uk-UA" dirty="0" smtClean="0"/>
             </a:br>
+            <a:endParaRPr lang="uk-UA" dirty="0" smtClean="0"/>
+          </a:p>
+          <a:p>
             <a:r>
               <a:rPr lang="uk-UA" dirty="0" smtClean="0"/>
-              <a:t>Керівник:</a:t>
+              <a:t>Керівник</a:t>
+            </a:r>
+            <a:r>
+              <a:rPr lang="uk-UA" dirty="0" smtClean="0"/>
+              <a:t>:</a:t>
             </a:r>
           </a:p>
           <a:p>
@@ -3235,7 +3261,19 @@
           <a:bodyPr/>
           <a:lstStyle/>
           <a:p>
-            <a:endParaRPr lang="ru-RU"/>
+            <a:r>
+              <a:rPr lang="ru-RU" dirty="0" err="1" smtClean="0"/>
+              <a:t>Розглянуті</a:t>
+            </a:r>
+            <a:r>
+              <a:rPr lang="ru-RU" dirty="0" smtClean="0"/>
+              <a:t> </a:t>
+            </a:r>
+            <a:r>
+              <a:rPr lang="ru-RU" dirty="0" err="1" smtClean="0"/>
+              <a:t>класифікатори</a:t>
+            </a:r>
+            <a:endParaRPr lang="ru-RU" dirty="0"/>
           </a:p>
         </p:txBody>
       </p:sp>
@@ -3251,569 +3289,39 @@
         </p:nvSpPr>
         <p:spPr/>
         <p:txBody>
-          <a:bodyPr>
-            <a:normAutofit fontScale="32500" lnSpcReduction="20000"/>
-          </a:bodyPr>
-          <a:lstStyle/>
-          <a:p>
-            <a:r>
-              <a:rPr lang="ru-RU" dirty="0" smtClean="0"/>
-              <a:t>1. Тема </a:t>
-            </a:r>
-            <a:r>
-              <a:rPr lang="ru-RU" dirty="0" err="1" smtClean="0"/>
-              <a:t>роботи</a:t>
-            </a:r>
-            <a:r>
-              <a:rPr lang="ru-RU" dirty="0" smtClean="0"/>
-              <a:t> (проекту): </a:t>
-            </a:r>
-            <a:r>
-              <a:rPr lang="ru-RU" dirty="0" err="1" smtClean="0"/>
-              <a:t>Шановні</a:t>
-            </a:r>
-            <a:r>
-              <a:rPr lang="ru-RU" dirty="0" smtClean="0"/>
-              <a:t> члени </a:t>
-            </a:r>
-            <a:r>
-              <a:rPr lang="ru-RU" dirty="0" err="1" smtClean="0"/>
-              <a:t>комісії</a:t>
-            </a:r>
-            <a:r>
-              <a:rPr lang="ru-RU" dirty="0" smtClean="0"/>
-              <a:t> та </a:t>
-            </a:r>
-            <a:r>
-              <a:rPr lang="ru-RU" dirty="0" err="1" smtClean="0"/>
-              <a:t>присутні</a:t>
-            </a:r>
-            <a:r>
-              <a:rPr lang="ru-RU" dirty="0" smtClean="0"/>
-              <a:t>, </a:t>
-            </a:r>
-            <a:r>
-              <a:rPr lang="ru-RU" dirty="0" err="1" smtClean="0"/>
-              <a:t>Вашій</a:t>
-            </a:r>
-            <a:r>
-              <a:rPr lang="ru-RU" dirty="0" smtClean="0"/>
-              <a:t> </a:t>
-            </a:r>
-            <a:r>
-              <a:rPr lang="ru-RU" dirty="0" err="1" smtClean="0"/>
-              <a:t>увазі</a:t>
-            </a:r>
-            <a:endParaRPr lang="ru-RU" dirty="0" smtClean="0"/>
-          </a:p>
-          <a:p>
-            <a:endParaRPr lang="ru-RU" dirty="0" smtClean="0"/>
-          </a:p>
-          <a:p>
-            <a:r>
-              <a:rPr lang="ru-RU" dirty="0" err="1" smtClean="0"/>
-              <a:t>пропонується</a:t>
-            </a:r>
-            <a:r>
-              <a:rPr lang="ru-RU" dirty="0" smtClean="0"/>
-              <a:t> </a:t>
-            </a:r>
-            <a:r>
-              <a:rPr lang="ru-RU" dirty="0" err="1" smtClean="0"/>
-              <a:t>магістерська</a:t>
-            </a:r>
-            <a:r>
-              <a:rPr lang="ru-RU" dirty="0" smtClean="0"/>
-              <a:t> робота на тему:</a:t>
-            </a:r>
-          </a:p>
-          <a:p>
-            <a:endParaRPr lang="ru-RU" dirty="0" smtClean="0"/>
-          </a:p>
-          <a:p>
-            <a:r>
-              <a:rPr lang="ru-RU" dirty="0" smtClean="0"/>
-              <a:t>2. Мета </a:t>
-            </a:r>
-            <a:r>
-              <a:rPr lang="ru-RU" dirty="0" err="1" smtClean="0"/>
-              <a:t>дослідження</a:t>
-            </a:r>
-            <a:r>
-              <a:rPr lang="ru-RU" dirty="0" smtClean="0"/>
-              <a:t> (</a:t>
-            </a:r>
-            <a:r>
-              <a:rPr lang="ru-RU" dirty="0" err="1" smtClean="0"/>
-              <a:t>розробки</a:t>
-            </a:r>
-            <a:r>
-              <a:rPr lang="ru-RU" dirty="0" smtClean="0"/>
-              <a:t>) </a:t>
-            </a:r>
-            <a:r>
-              <a:rPr lang="ru-RU" dirty="0" err="1" smtClean="0"/>
-              <a:t>полягає</a:t>
-            </a:r>
-            <a:r>
-              <a:rPr lang="ru-RU" dirty="0" smtClean="0"/>
-              <a:t> в …..</a:t>
-            </a:r>
-          </a:p>
-          <a:p>
-            <a:endParaRPr lang="ru-RU" dirty="0" smtClean="0"/>
-          </a:p>
-          <a:p>
-            <a:r>
-              <a:rPr lang="ru-RU" dirty="0" smtClean="0"/>
-              <a:t>3. Короткий </a:t>
-            </a:r>
-            <a:r>
-              <a:rPr lang="ru-RU" dirty="0" err="1" smtClean="0"/>
-              <a:t>огляд</a:t>
-            </a:r>
-            <a:r>
-              <a:rPr lang="ru-RU" dirty="0" smtClean="0"/>
-              <a:t> </a:t>
-            </a:r>
-            <a:r>
-              <a:rPr lang="ru-RU" dirty="0" err="1" smtClean="0"/>
-              <a:t>відомих</a:t>
-            </a:r>
-            <a:r>
-              <a:rPr lang="ru-RU" dirty="0" smtClean="0"/>
-              <a:t> </a:t>
-            </a:r>
-            <a:r>
-              <a:rPr lang="ru-RU" dirty="0" err="1" smtClean="0"/>
-              <a:t>підходів</a:t>
-            </a:r>
-            <a:r>
-              <a:rPr lang="ru-RU" dirty="0" smtClean="0"/>
-              <a:t> до </a:t>
-            </a:r>
-            <a:r>
-              <a:rPr lang="ru-RU" dirty="0" err="1" smtClean="0"/>
-              <a:t>розв</a:t>
-            </a:r>
-            <a:r>
-              <a:rPr lang="ru-RU" dirty="0" smtClean="0"/>
-              <a:t>&amp;#39;язку </a:t>
-            </a:r>
-            <a:r>
-              <a:rPr lang="ru-RU" dirty="0" err="1" smtClean="0"/>
-              <a:t>задачі</a:t>
-            </a:r>
-            <a:r>
-              <a:rPr lang="ru-RU" dirty="0" smtClean="0"/>
-              <a:t>.</a:t>
-            </a:r>
-          </a:p>
-          <a:p>
-            <a:endParaRPr lang="ru-RU" dirty="0" smtClean="0"/>
-          </a:p>
-          <a:p>
-            <a:r>
-              <a:rPr lang="ru-RU" dirty="0" smtClean="0"/>
-              <a:t>4. Суть </a:t>
-            </a:r>
-            <a:r>
-              <a:rPr lang="ru-RU" dirty="0" err="1" smtClean="0"/>
-              <a:t>запропонованого</a:t>
-            </a:r>
-            <a:r>
-              <a:rPr lang="ru-RU" dirty="0" smtClean="0"/>
-              <a:t> методу (</a:t>
-            </a:r>
-            <a:r>
-              <a:rPr lang="ru-RU" dirty="0" err="1" smtClean="0"/>
-              <a:t>чи</a:t>
-            </a:r>
-            <a:r>
-              <a:rPr lang="ru-RU" dirty="0" smtClean="0"/>
-              <a:t> алгоритму).</a:t>
-            </a:r>
-          </a:p>
-          <a:p>
-            <a:endParaRPr lang="ru-RU" dirty="0" smtClean="0"/>
-          </a:p>
-          <a:p>
-            <a:r>
-              <a:rPr lang="ru-RU" dirty="0" smtClean="0"/>
-              <a:t>5. Приклад </a:t>
-            </a:r>
-            <a:r>
-              <a:rPr lang="ru-RU" dirty="0" err="1" smtClean="0"/>
-              <a:t>застосування</a:t>
-            </a:r>
-            <a:r>
-              <a:rPr lang="ru-RU" dirty="0" smtClean="0"/>
-              <a:t> методу до </a:t>
-            </a:r>
-            <a:r>
-              <a:rPr lang="ru-RU" dirty="0" err="1" smtClean="0"/>
-              <a:t>розв</a:t>
-            </a:r>
-            <a:r>
-              <a:rPr lang="ru-RU" dirty="0" smtClean="0"/>
-              <a:t>&amp;#39;язку </a:t>
-            </a:r>
-            <a:r>
-              <a:rPr lang="ru-RU" dirty="0" err="1" smtClean="0"/>
-              <a:t>модельної</a:t>
-            </a:r>
-            <a:r>
-              <a:rPr lang="ru-RU" dirty="0" smtClean="0"/>
-              <a:t> </a:t>
-            </a:r>
-            <a:r>
-              <a:rPr lang="ru-RU" dirty="0" err="1" smtClean="0"/>
-              <a:t>чи</a:t>
-            </a:r>
-            <a:r>
-              <a:rPr lang="ru-RU" dirty="0" smtClean="0"/>
-              <a:t> </a:t>
-            </a:r>
-            <a:r>
-              <a:rPr lang="ru-RU" dirty="0" err="1" smtClean="0"/>
-              <a:t>реальної</a:t>
-            </a:r>
-            <a:r>
-              <a:rPr lang="ru-RU" dirty="0" smtClean="0"/>
-              <a:t> </a:t>
-            </a:r>
-            <a:r>
-              <a:rPr lang="ru-RU" dirty="0" err="1" smtClean="0"/>
-              <a:t>задачі</a:t>
-            </a:r>
-            <a:r>
-              <a:rPr lang="ru-RU" dirty="0" smtClean="0"/>
-              <a:t>.</a:t>
-            </a:r>
-          </a:p>
-          <a:p>
-            <a:endParaRPr lang="ru-RU" dirty="0" smtClean="0"/>
-          </a:p>
-          <a:p>
-            <a:r>
-              <a:rPr lang="ru-RU" dirty="0" smtClean="0"/>
-              <a:t>6. </a:t>
-            </a:r>
-            <a:r>
-              <a:rPr lang="ru-RU" dirty="0" err="1" smtClean="0"/>
-              <a:t>Інші</a:t>
-            </a:r>
-            <a:r>
-              <a:rPr lang="ru-RU" dirty="0" smtClean="0"/>
-              <a:t> </a:t>
-            </a:r>
-            <a:r>
-              <a:rPr lang="ru-RU" dirty="0" err="1" smtClean="0"/>
-              <a:t>приклади</a:t>
-            </a:r>
-            <a:r>
-              <a:rPr lang="ru-RU" dirty="0" smtClean="0"/>
-              <a:t> </a:t>
-            </a:r>
-            <a:r>
-              <a:rPr lang="ru-RU" dirty="0" err="1" smtClean="0"/>
-              <a:t>застосування</a:t>
-            </a:r>
-            <a:r>
-              <a:rPr lang="ru-RU" dirty="0" smtClean="0"/>
-              <a:t>.</a:t>
-            </a:r>
-          </a:p>
-          <a:p>
-            <a:endParaRPr lang="ru-RU" dirty="0" smtClean="0"/>
-          </a:p>
-          <a:p>
-            <a:r>
-              <a:rPr lang="ru-RU" dirty="0" smtClean="0"/>
-              <a:t>7. </a:t>
-            </a:r>
-            <a:r>
-              <a:rPr lang="ru-RU" dirty="0" err="1" smtClean="0"/>
-              <a:t>Порівняти</a:t>
-            </a:r>
-            <a:r>
-              <a:rPr lang="ru-RU" dirty="0" smtClean="0"/>
-              <a:t> </a:t>
-            </a:r>
-            <a:r>
-              <a:rPr lang="ru-RU" dirty="0" err="1" smtClean="0"/>
-              <a:t>результати</a:t>
-            </a:r>
-            <a:r>
-              <a:rPr lang="ru-RU" dirty="0" smtClean="0"/>
-              <a:t>, </a:t>
-            </a:r>
-            <a:r>
-              <a:rPr lang="ru-RU" dirty="0" err="1" smtClean="0"/>
-              <a:t>отримані</a:t>
-            </a:r>
-            <a:r>
-              <a:rPr lang="ru-RU" dirty="0" smtClean="0"/>
-              <a:t> за </a:t>
-            </a:r>
-            <a:r>
-              <a:rPr lang="ru-RU" dirty="0" err="1" smtClean="0"/>
-              <a:t>допомогою</a:t>
-            </a:r>
-            <a:r>
-              <a:rPr lang="ru-RU" dirty="0" smtClean="0"/>
-              <a:t> </a:t>
-            </a:r>
-            <a:r>
-              <a:rPr lang="ru-RU" dirty="0" err="1" smtClean="0"/>
-              <a:t>запропонованого</a:t>
-            </a:r>
-            <a:r>
-              <a:rPr lang="ru-RU" dirty="0" smtClean="0"/>
-              <a:t> методу, з</a:t>
-            </a:r>
-          </a:p>
-          <a:p>
-            <a:endParaRPr lang="ru-RU" dirty="0" smtClean="0"/>
-          </a:p>
-          <a:p>
-            <a:r>
-              <a:rPr lang="ru-RU" dirty="0" err="1" smtClean="0"/>
-              <a:t>іншими</a:t>
-            </a:r>
-            <a:r>
-              <a:rPr lang="ru-RU" dirty="0" smtClean="0"/>
-              <a:t> (</a:t>
-            </a:r>
-            <a:r>
-              <a:rPr lang="ru-RU" dirty="0" err="1" smtClean="0"/>
-              <a:t>відомими</a:t>
-            </a:r>
-            <a:r>
-              <a:rPr lang="ru-RU" dirty="0" smtClean="0"/>
-              <a:t> з </a:t>
-            </a:r>
-            <a:r>
-              <a:rPr lang="ru-RU" dirty="0" err="1" smtClean="0"/>
-              <a:t>літератури</a:t>
-            </a:r>
-            <a:r>
-              <a:rPr lang="ru-RU" dirty="0" smtClean="0"/>
-              <a:t> </a:t>
-            </a:r>
-            <a:r>
-              <a:rPr lang="ru-RU" dirty="0" err="1" smtClean="0"/>
-              <a:t>або</a:t>
-            </a:r>
-            <a:r>
-              <a:rPr lang="ru-RU" dirty="0" smtClean="0"/>
-              <a:t> </a:t>
-            </a:r>
-            <a:r>
-              <a:rPr lang="ru-RU" dirty="0" err="1" smtClean="0"/>
-              <a:t>отриманими</a:t>
-            </a:r>
-            <a:r>
-              <a:rPr lang="ru-RU" dirty="0" smtClean="0"/>
-              <a:t> дипломником за </a:t>
-            </a:r>
-            <a:r>
-              <a:rPr lang="ru-RU" dirty="0" err="1" smtClean="0"/>
-              <a:t>допомогою</a:t>
-            </a:r>
-            <a:endParaRPr lang="ru-RU" dirty="0" smtClean="0"/>
-          </a:p>
-          <a:p>
-            <a:endParaRPr lang="ru-RU" dirty="0" smtClean="0"/>
-          </a:p>
-          <a:p>
-            <a:r>
-              <a:rPr lang="ru-RU" dirty="0" err="1" smtClean="0"/>
-              <a:t>відомого</a:t>
-            </a:r>
-            <a:r>
-              <a:rPr lang="ru-RU" dirty="0" smtClean="0"/>
-              <a:t> методу).</a:t>
-            </a:r>
-          </a:p>
-          <a:p>
-            <a:endParaRPr lang="ru-RU" dirty="0" smtClean="0"/>
-          </a:p>
-          <a:p>
-            <a:r>
-              <a:rPr lang="ru-RU" dirty="0" smtClean="0"/>
-              <a:t>8. </a:t>
-            </a:r>
-            <a:r>
-              <a:rPr lang="ru-RU" dirty="0" err="1" smtClean="0"/>
-              <a:t>Сформулювати</a:t>
-            </a:r>
-            <a:r>
-              <a:rPr lang="ru-RU" dirty="0" smtClean="0"/>
-              <a:t> </a:t>
-            </a:r>
-            <a:r>
-              <a:rPr lang="ru-RU" dirty="0" err="1" smtClean="0"/>
-              <a:t>наукову</a:t>
-            </a:r>
-            <a:r>
-              <a:rPr lang="ru-RU" dirty="0" smtClean="0"/>
-              <a:t> новизну </a:t>
-            </a:r>
-            <a:r>
-              <a:rPr lang="ru-RU" dirty="0" err="1" smtClean="0"/>
-              <a:t>результатів</a:t>
-            </a:r>
-            <a:r>
-              <a:rPr lang="ru-RU" dirty="0" smtClean="0"/>
-              <a:t> </a:t>
-            </a:r>
-            <a:r>
-              <a:rPr lang="ru-RU" dirty="0" err="1" smtClean="0"/>
-              <a:t>роботи</a:t>
-            </a:r>
-            <a:r>
-              <a:rPr lang="ru-RU" dirty="0" smtClean="0"/>
-              <a:t> (коротко).</a:t>
-            </a:r>
-          </a:p>
-          <a:p>
-            <a:endParaRPr lang="ru-RU" dirty="0" smtClean="0"/>
-          </a:p>
-          <a:p>
-            <a:r>
-              <a:rPr lang="ru-RU" dirty="0" smtClean="0"/>
-              <a:t>9. </a:t>
-            </a:r>
-            <a:r>
-              <a:rPr lang="ru-RU" dirty="0" err="1" smtClean="0"/>
-              <a:t>Сформулювати</a:t>
-            </a:r>
-            <a:r>
-              <a:rPr lang="ru-RU" dirty="0" smtClean="0"/>
-              <a:t> </a:t>
-            </a:r>
-            <a:r>
-              <a:rPr lang="ru-RU" dirty="0" err="1" smtClean="0"/>
-              <a:t>практичну</a:t>
-            </a:r>
-            <a:r>
-              <a:rPr lang="ru-RU" dirty="0" smtClean="0"/>
-              <a:t> </a:t>
-            </a:r>
-            <a:r>
-              <a:rPr lang="ru-RU" dirty="0" err="1" smtClean="0"/>
-              <a:t>значимість</a:t>
-            </a:r>
-            <a:r>
-              <a:rPr lang="ru-RU" dirty="0" smtClean="0"/>
-              <a:t> </a:t>
-            </a:r>
-            <a:r>
-              <a:rPr lang="ru-RU" dirty="0" err="1" smtClean="0"/>
-              <a:t>результатів</a:t>
-            </a:r>
-            <a:r>
-              <a:rPr lang="ru-RU" dirty="0" smtClean="0"/>
-              <a:t> </a:t>
-            </a:r>
-            <a:r>
-              <a:rPr lang="ru-RU" dirty="0" err="1" smtClean="0"/>
-              <a:t>роботи</a:t>
-            </a:r>
-            <a:r>
-              <a:rPr lang="ru-RU" dirty="0" smtClean="0"/>
-              <a:t> (коротко).</a:t>
-            </a:r>
-          </a:p>
-          <a:p>
-            <a:endParaRPr lang="ru-RU" dirty="0" smtClean="0"/>
-          </a:p>
-          <a:p>
-            <a:r>
-              <a:rPr lang="ru-RU" dirty="0" smtClean="0"/>
-              <a:t>10. </a:t>
-            </a:r>
-            <a:r>
-              <a:rPr lang="ru-RU" dirty="0" err="1" smtClean="0"/>
-              <a:t>Перспективи</a:t>
-            </a:r>
-            <a:r>
-              <a:rPr lang="ru-RU" dirty="0" smtClean="0"/>
-              <a:t> та </a:t>
-            </a:r>
-            <a:r>
-              <a:rPr lang="ru-RU" dirty="0" err="1" smtClean="0"/>
-              <a:t>рекомендації</a:t>
-            </a:r>
-            <a:r>
-              <a:rPr lang="ru-RU" dirty="0" smtClean="0"/>
-              <a:t> для </a:t>
-            </a:r>
-            <a:r>
-              <a:rPr lang="ru-RU" dirty="0" err="1" smtClean="0"/>
-              <a:t>подальших</a:t>
-            </a:r>
-            <a:r>
-              <a:rPr lang="ru-RU" dirty="0" smtClean="0"/>
-              <a:t> </a:t>
-            </a:r>
-            <a:r>
-              <a:rPr lang="ru-RU" dirty="0" err="1" smtClean="0"/>
-              <a:t>досліджень</a:t>
-            </a:r>
-            <a:r>
-              <a:rPr lang="ru-RU" dirty="0" smtClean="0"/>
-              <a:t>.</a:t>
-            </a:r>
-          </a:p>
-          <a:p>
-            <a:endParaRPr lang="ru-RU" dirty="0" smtClean="0"/>
-          </a:p>
-          <a:p>
-            <a:r>
-              <a:rPr lang="ru-RU" dirty="0" smtClean="0"/>
-              <a:t>11. </a:t>
-            </a:r>
-            <a:r>
-              <a:rPr lang="ru-RU" dirty="0" err="1" smtClean="0"/>
-              <a:t>Доповідь</a:t>
-            </a:r>
-            <a:r>
-              <a:rPr lang="ru-RU" dirty="0" smtClean="0"/>
-              <a:t> </a:t>
-            </a:r>
-            <a:r>
-              <a:rPr lang="ru-RU" dirty="0" err="1" smtClean="0"/>
-              <a:t>закінчена</a:t>
-            </a:r>
-            <a:r>
-              <a:rPr lang="ru-RU" dirty="0" smtClean="0"/>
-              <a:t>. </a:t>
-            </a:r>
-            <a:r>
-              <a:rPr lang="ru-RU" dirty="0" err="1" smtClean="0"/>
-              <a:t>Дякую</a:t>
-            </a:r>
-            <a:r>
-              <a:rPr lang="ru-RU" dirty="0" smtClean="0"/>
-              <a:t> за </a:t>
-            </a:r>
-            <a:r>
-              <a:rPr lang="ru-RU" dirty="0" err="1" smtClean="0"/>
-              <a:t>увагу</a:t>
-            </a:r>
-            <a:r>
-              <a:rPr lang="ru-RU" dirty="0" smtClean="0"/>
-              <a:t>! (Не забудьте </a:t>
-            </a:r>
-            <a:r>
-              <a:rPr lang="ru-RU" dirty="0" err="1" smtClean="0"/>
-              <a:t>подякувати</a:t>
-            </a:r>
-            <a:r>
-              <a:rPr lang="ru-RU" dirty="0" smtClean="0"/>
-              <a:t>!)</a:t>
+          <a:bodyPr/>
+          <a:lstStyle/>
+          <a:p>
+            <a:r>
+              <a:rPr lang="en-US" dirty="0" smtClean="0"/>
+              <a:t>K Nearest </a:t>
+            </a:r>
+            <a:r>
+              <a:rPr lang="en-US" dirty="0" err="1" smtClean="0"/>
+              <a:t>Neighbours</a:t>
+            </a:r>
+            <a:r>
+              <a:rPr lang="en-US" dirty="0" smtClean="0"/>
+              <a:t> (KNN)</a:t>
+            </a:r>
+          </a:p>
+          <a:p>
+            <a:r>
+              <a:rPr lang="en-US" sz="4000" dirty="0" smtClean="0">
+                <a:solidFill>
+                  <a:schemeClr val="tx2">
+                    <a:lumMod val="60000"/>
+                    <a:lumOff val="40000"/>
+                  </a:schemeClr>
+                </a:solidFill>
+              </a:rPr>
+              <a:t>Naïve Bayes</a:t>
+            </a:r>
+          </a:p>
+          <a:p>
+            <a:r>
+              <a:rPr lang="en-US" dirty="0" smtClean="0"/>
+              <a:t>Logistic regression</a:t>
             </a:r>
             <a:endParaRPr lang="ru-RU" dirty="0"/>
           </a:p>
@@ -3822,7 +3330,1251 @@
     </p:spTree>
     <p:extLst>
       <p:ext uri="{BB962C8B-B14F-4D97-AF65-F5344CB8AC3E}">
-        <p14:creationId xmlns:p14="http://schemas.microsoft.com/office/powerpoint/2010/main" val="3272714295"/>
+        <p14:creationId xmlns:p14="http://schemas.microsoft.com/office/powerpoint/2010/main" val="2057251939"/>
+      </p:ext>
+    </p:extLst>
+  </p:cSld>
+  <p:clrMapOvr>
+    <a:masterClrMapping/>
+  </p:clrMapOvr>
+  <p:timing>
+    <p:tnLst>
+      <p:par>
+        <p:cTn xmlns:p14="http://schemas.microsoft.com/office/powerpoint/2010/main" id="1" dur="indefinite" restart="never" nodeType="tmRoot"/>
+      </p:par>
+    </p:tnLst>
+  </p:timing>
+</p:sld>
+</file>
+
+<file path=ppt/slides/slide11.xml><?xml version="1.0" encoding="utf-8"?>
+<p:sld xmlns:a="http://schemas.openxmlformats.org/drawingml/2006/main" xmlns:r="http://schemas.openxmlformats.org/officeDocument/2006/relationships" xmlns:p="http://schemas.openxmlformats.org/presentationml/2006/main">
+  <p:cSld>
+    <p:spTree>
+      <p:nvGrpSpPr>
+        <p:cNvPr id="1" name=""/>
+        <p:cNvGrpSpPr/>
+        <p:nvPr/>
+      </p:nvGrpSpPr>
+      <p:grpSpPr>
+        <a:xfrm>
+          <a:off x="0" y="0"/>
+          <a:ext cx="0" cy="0"/>
+          <a:chOff x="0" y="0"/>
+          <a:chExt cx="0" cy="0"/>
+        </a:xfrm>
+      </p:grpSpPr>
+      <p:sp>
+        <p:nvSpPr>
+          <p:cNvPr id="2" name="Название 1"/>
+          <p:cNvSpPr>
+            <a:spLocks noGrp="1"/>
+          </p:cNvSpPr>
+          <p:nvPr>
+            <p:ph type="title"/>
+          </p:nvPr>
+        </p:nvSpPr>
+        <p:spPr/>
+        <p:txBody>
+          <a:bodyPr>
+            <a:normAutofit fontScale="90000"/>
+          </a:bodyPr>
+          <a:lstStyle/>
+          <a:p>
+            <a:r>
+              <a:rPr lang="ru-RU" dirty="0" err="1" smtClean="0"/>
+              <a:t>Статистичний</a:t>
+            </a:r>
+            <a:r>
+              <a:rPr lang="ru-RU" dirty="0" smtClean="0"/>
+              <a:t> </a:t>
+            </a:r>
+            <a:r>
+              <a:rPr lang="ru-RU" dirty="0" err="1" smtClean="0"/>
+              <a:t>підхід</a:t>
+            </a:r>
+            <a:r>
+              <a:rPr lang="ru-RU" dirty="0" smtClean="0"/>
+              <a:t> в </a:t>
+            </a:r>
+            <a:r>
+              <a:rPr lang="ru-RU" dirty="0" err="1" smtClean="0"/>
+              <a:t>Наївному</a:t>
+            </a:r>
+            <a:r>
+              <a:rPr lang="ru-RU" dirty="0" smtClean="0"/>
+              <a:t> </a:t>
+            </a:r>
+            <a:r>
+              <a:rPr lang="ru-RU" dirty="0" err="1" smtClean="0"/>
+              <a:t>Баєсі</a:t>
+            </a:r>
+            <a:endParaRPr lang="ru-RU" dirty="0"/>
+          </a:p>
+        </p:txBody>
+      </p:sp>
+      <p:graphicFrame>
+        <p:nvGraphicFramePr>
+          <p:cNvPr id="4" name="Содержимое 3"/>
+          <p:cNvGraphicFramePr>
+            <a:graphicFrameLocks noGrp="1"/>
+          </p:cNvGraphicFramePr>
+          <p:nvPr>
+            <p:ph idx="1"/>
+            <p:extLst>
+              <p:ext uri="{D42A27DB-BD31-4B8C-83A1-F6EECF244321}">
+                <p14:modId xmlns:p14="http://schemas.microsoft.com/office/powerpoint/2010/main" val="3184822937"/>
+              </p:ext>
+            </p:extLst>
+          </p:nvPr>
+        </p:nvGraphicFramePr>
+        <p:xfrm>
+          <a:off x="488950" y="1600200"/>
+          <a:ext cx="8229600" cy="1483360"/>
+        </p:xfrm>
+        <a:graphic>
+          <a:graphicData uri="http://schemas.openxmlformats.org/drawingml/2006/table">
+            <a:tbl>
+              <a:tblPr firstRow="1" bandRow="1">
+                <a:tableStyleId>{5C22544A-7EE6-4342-B048-85BDC9FD1C3A}</a:tableStyleId>
+              </a:tblPr>
+              <a:tblGrid>
+                <a:gridCol w="4114800"/>
+                <a:gridCol w="4114800"/>
+              </a:tblGrid>
+              <a:tr h="370840">
+                <a:tc>
+                  <a:txBody>
+                    <a:bodyPr/>
+                    <a:lstStyle/>
+                    <a:p>
+                      <a:r>
+                        <a:rPr lang="ru-RU" dirty="0" err="1" smtClean="0"/>
+                        <a:t>Ймовірність</a:t>
+                      </a:r>
+                      <a:endParaRPr lang="ru-RU" dirty="0"/>
+                    </a:p>
+                  </a:txBody>
+                  <a:tcPr/>
+                </a:tc>
+                <a:tc>
+                  <a:txBody>
+                    <a:bodyPr/>
+                    <a:lstStyle/>
+                    <a:p>
+                      <a:r>
+                        <a:rPr lang="ru-RU" dirty="0" smtClean="0"/>
+                        <a:t>Слово</a:t>
+                      </a:r>
+                      <a:r>
+                        <a:rPr lang="ru-RU" baseline="0" dirty="0" smtClean="0"/>
+                        <a:t>(основа)</a:t>
+                      </a:r>
+                      <a:endParaRPr lang="ru-RU" dirty="0"/>
+                    </a:p>
+                  </a:txBody>
+                  <a:tcPr/>
+                </a:tc>
+              </a:tr>
+              <a:tr h="370840">
+                <a:tc>
+                  <a:txBody>
+                    <a:bodyPr/>
+                    <a:lstStyle/>
+                    <a:p>
+                      <a:r>
+                        <a:rPr lang="en-US" dirty="0" smtClean="0"/>
+                        <a:t>0.05</a:t>
+                      </a:r>
+                      <a:endParaRPr lang="ru-RU" dirty="0"/>
+                    </a:p>
+                  </a:txBody>
+                  <a:tcPr/>
+                </a:tc>
+                <a:tc>
+                  <a:txBody>
+                    <a:bodyPr/>
+                    <a:lstStyle/>
+                    <a:p>
+                      <a:r>
+                        <a:rPr lang="uk-UA" dirty="0" smtClean="0"/>
+                        <a:t>Я</a:t>
+                      </a:r>
+                      <a:endParaRPr lang="ru-RU" dirty="0"/>
+                    </a:p>
+                  </a:txBody>
+                  <a:tcPr/>
+                </a:tc>
+              </a:tr>
+              <a:tr h="370840">
+                <a:tc>
+                  <a:txBody>
+                    <a:bodyPr/>
+                    <a:lstStyle/>
+                    <a:p>
+                      <a:r>
+                        <a:rPr lang="en-US" dirty="0" smtClean="0"/>
+                        <a:t>0.2</a:t>
+                      </a:r>
+                      <a:endParaRPr lang="ru-RU" dirty="0"/>
+                    </a:p>
+                  </a:txBody>
+                  <a:tcPr/>
+                </a:tc>
+                <a:tc>
+                  <a:txBody>
+                    <a:bodyPr/>
+                    <a:lstStyle/>
+                    <a:p>
+                      <a:r>
+                        <a:rPr lang="ru-RU" dirty="0" err="1" smtClean="0"/>
+                        <a:t>любити</a:t>
+                      </a:r>
+                      <a:endParaRPr lang="ru-RU" dirty="0"/>
+                    </a:p>
+                  </a:txBody>
+                  <a:tcPr/>
+                </a:tc>
+              </a:tr>
+              <a:tr h="370840">
+                <a:tc>
+                  <a:txBody>
+                    <a:bodyPr/>
+                    <a:lstStyle/>
+                    <a:p>
+                      <a:r>
+                        <a:rPr lang="ru-RU" dirty="0" smtClean="0"/>
+                        <a:t>0.5</a:t>
+                      </a:r>
+                      <a:endParaRPr lang="ru-RU" dirty="0"/>
+                    </a:p>
+                  </a:txBody>
+                  <a:tcPr/>
+                </a:tc>
+                <a:tc>
+                  <a:txBody>
+                    <a:bodyPr/>
+                    <a:lstStyle/>
+                    <a:p>
+                      <a:r>
+                        <a:rPr lang="ru-RU" dirty="0" smtClean="0"/>
+                        <a:t>математика</a:t>
+                      </a:r>
+                      <a:endParaRPr lang="ru-RU" dirty="0"/>
+                    </a:p>
+                  </a:txBody>
+                  <a:tcPr/>
+                </a:tc>
+              </a:tr>
+            </a:tbl>
+          </a:graphicData>
+        </a:graphic>
+      </p:graphicFrame>
+      <p:graphicFrame>
+        <p:nvGraphicFramePr>
+          <p:cNvPr id="6" name="Таблица 5"/>
+          <p:cNvGraphicFramePr>
+            <a:graphicFrameLocks noGrp="1"/>
+          </p:cNvGraphicFramePr>
+          <p:nvPr>
+            <p:extLst>
+              <p:ext uri="{D42A27DB-BD31-4B8C-83A1-F6EECF244321}">
+                <p14:modId xmlns:p14="http://schemas.microsoft.com/office/powerpoint/2010/main" val="3501883531"/>
+              </p:ext>
+            </p:extLst>
+          </p:nvPr>
+        </p:nvGraphicFramePr>
+        <p:xfrm>
+          <a:off x="488950" y="3778250"/>
+          <a:ext cx="8197850" cy="1483360"/>
+        </p:xfrm>
+        <a:graphic>
+          <a:graphicData uri="http://schemas.openxmlformats.org/drawingml/2006/table">
+            <a:tbl>
+              <a:tblPr firstRow="1" bandRow="1">
+                <a:tableStyleId>{21E4AEA4-8DFA-4A89-87EB-49C32662AFE0}</a:tableStyleId>
+              </a:tblPr>
+              <a:tblGrid>
+                <a:gridCol w="4098925"/>
+                <a:gridCol w="4098925"/>
+              </a:tblGrid>
+              <a:tr h="370840">
+                <a:tc>
+                  <a:txBody>
+                    <a:bodyPr/>
+                    <a:lstStyle/>
+                    <a:p>
+                      <a:r>
+                        <a:rPr lang="ru-RU" dirty="0" err="1" smtClean="0"/>
+                        <a:t>Ймовірність</a:t>
+                      </a:r>
+                      <a:endParaRPr lang="ru-RU" dirty="0"/>
+                    </a:p>
+                  </a:txBody>
+                  <a:tcPr/>
+                </a:tc>
+                <a:tc>
+                  <a:txBody>
+                    <a:bodyPr/>
+                    <a:lstStyle/>
+                    <a:p>
+                      <a:r>
+                        <a:rPr lang="ru-RU" dirty="0" smtClean="0"/>
+                        <a:t>Слово(основа)</a:t>
+                      </a:r>
+                      <a:endParaRPr lang="ru-RU" dirty="0"/>
+                    </a:p>
+                  </a:txBody>
+                  <a:tcPr/>
+                </a:tc>
+              </a:tr>
+              <a:tr h="370840">
+                <a:tc>
+                  <a:txBody>
+                    <a:bodyPr/>
+                    <a:lstStyle/>
+                    <a:p>
+                      <a:r>
+                        <a:rPr lang="ru-RU" dirty="0" smtClean="0"/>
+                        <a:t>0.005</a:t>
+                      </a:r>
+                      <a:endParaRPr lang="ru-RU" dirty="0"/>
+                    </a:p>
+                  </a:txBody>
+                  <a:tcPr/>
+                </a:tc>
+                <a:tc>
+                  <a:txBody>
+                    <a:bodyPr/>
+                    <a:lstStyle/>
+                    <a:p>
+                      <a:r>
+                        <a:rPr lang="ru-RU" dirty="0" smtClean="0"/>
+                        <a:t>Я</a:t>
+                      </a:r>
+                      <a:endParaRPr lang="ru-RU" dirty="0"/>
+                    </a:p>
+                  </a:txBody>
+                  <a:tcPr/>
+                </a:tc>
+              </a:tr>
+              <a:tr h="370840">
+                <a:tc>
+                  <a:txBody>
+                    <a:bodyPr/>
+                    <a:lstStyle/>
+                    <a:p>
+                      <a:r>
+                        <a:rPr lang="ru-RU" dirty="0" smtClean="0"/>
+                        <a:t>0.02</a:t>
+                      </a:r>
+                      <a:endParaRPr lang="ru-RU" dirty="0"/>
+                    </a:p>
+                  </a:txBody>
+                  <a:tcPr/>
+                </a:tc>
+                <a:tc>
+                  <a:txBody>
+                    <a:bodyPr/>
+                    <a:lstStyle/>
+                    <a:p>
+                      <a:r>
+                        <a:rPr lang="ru-RU" dirty="0" err="1" smtClean="0"/>
+                        <a:t>любити</a:t>
+                      </a:r>
+                      <a:endParaRPr lang="ru-RU" dirty="0"/>
+                    </a:p>
+                  </a:txBody>
+                  <a:tcPr/>
+                </a:tc>
+              </a:tr>
+              <a:tr h="370840">
+                <a:tc>
+                  <a:txBody>
+                    <a:bodyPr/>
+                    <a:lstStyle/>
+                    <a:p>
+                      <a:r>
+                        <a:rPr lang="ru-RU" dirty="0" smtClean="0"/>
+                        <a:t>0.05</a:t>
+                      </a:r>
+                      <a:endParaRPr lang="ru-RU" dirty="0"/>
+                    </a:p>
+                  </a:txBody>
+                  <a:tcPr/>
+                </a:tc>
+                <a:tc>
+                  <a:txBody>
+                    <a:bodyPr/>
+                    <a:lstStyle/>
+                    <a:p>
+                      <a:r>
+                        <a:rPr lang="ru-RU" dirty="0" smtClean="0"/>
+                        <a:t>математика</a:t>
+                      </a:r>
+                      <a:endParaRPr lang="ru-RU" dirty="0"/>
+                    </a:p>
+                  </a:txBody>
+                  <a:tcPr/>
+                </a:tc>
+              </a:tr>
+            </a:tbl>
+          </a:graphicData>
+        </a:graphic>
+      </p:graphicFrame>
+      <p:sp>
+        <p:nvSpPr>
+          <p:cNvPr id="7" name="TextBox 6"/>
+          <p:cNvSpPr txBox="1"/>
+          <p:nvPr/>
+        </p:nvSpPr>
+        <p:spPr>
+          <a:xfrm>
+            <a:off x="1412875" y="6032500"/>
+            <a:ext cx="6334125" cy="369332"/>
+          </a:xfrm>
+          <a:prstGeom prst="rect">
+            <a:avLst/>
+          </a:prstGeom>
+          <a:noFill/>
+        </p:spPr>
+        <p:txBody>
+          <a:bodyPr wrap="square" rtlCol="0">
+            <a:spAutoFit/>
+          </a:bodyPr>
+          <a:lstStyle/>
+          <a:p>
+            <a:r>
+              <a:rPr lang="en-US" dirty="0" smtClean="0"/>
+              <a:t>P(s | </a:t>
+            </a:r>
+            <a:r>
+              <a:rPr lang="uk-UA" dirty="0" smtClean="0"/>
+              <a:t>позитивний</a:t>
+            </a:r>
+            <a:r>
+              <a:rPr lang="en-US" dirty="0" smtClean="0"/>
+              <a:t>)</a:t>
+            </a:r>
+            <a:r>
+              <a:rPr lang="uk-UA" dirty="0" smtClean="0"/>
+              <a:t> = </a:t>
+            </a:r>
+            <a:r>
+              <a:rPr lang="en-US" dirty="0" smtClean="0"/>
+              <a:t>0.005 &gt; P(s | </a:t>
+            </a:r>
+            <a:r>
+              <a:rPr lang="uk-UA" dirty="0" smtClean="0"/>
+              <a:t>негативний) = </a:t>
+            </a:r>
+            <a:r>
+              <a:rPr lang="en-US" dirty="0" smtClean="0"/>
+              <a:t>0.000005</a:t>
+            </a:r>
+            <a:endParaRPr lang="ru-RU" dirty="0"/>
+          </a:p>
+        </p:txBody>
+      </p:sp>
+      <p:sp>
+        <p:nvSpPr>
+          <p:cNvPr id="8" name="TextBox 7"/>
+          <p:cNvSpPr txBox="1"/>
+          <p:nvPr/>
+        </p:nvSpPr>
+        <p:spPr>
+          <a:xfrm>
+            <a:off x="3190875" y="5504418"/>
+            <a:ext cx="2778125" cy="369332"/>
+          </a:xfrm>
+          <a:prstGeom prst="rect">
+            <a:avLst/>
+          </a:prstGeom>
+          <a:noFill/>
+        </p:spPr>
+        <p:txBody>
+          <a:bodyPr wrap="square" rtlCol="0">
+            <a:spAutoFit/>
+          </a:bodyPr>
+          <a:lstStyle/>
+          <a:p>
+            <a:r>
+              <a:rPr lang="en-US" dirty="0"/>
+              <a:t>s</a:t>
+            </a:r>
+            <a:r>
+              <a:rPr lang="uk-UA" dirty="0" smtClean="0"/>
+              <a:t> = “Я люблю математику”</a:t>
+            </a:r>
+            <a:endParaRPr lang="ru-RU" dirty="0"/>
+          </a:p>
+        </p:txBody>
+      </p:sp>
+    </p:spTree>
+    <p:extLst>
+      <p:ext uri="{BB962C8B-B14F-4D97-AF65-F5344CB8AC3E}">
+        <p14:creationId xmlns:p14="http://schemas.microsoft.com/office/powerpoint/2010/main" val="10076865"/>
+      </p:ext>
+    </p:extLst>
+  </p:cSld>
+  <p:clrMapOvr>
+    <a:masterClrMapping/>
+  </p:clrMapOvr>
+  <p:timing>
+    <p:tnLst>
+      <p:par>
+        <p:cTn xmlns:p14="http://schemas.microsoft.com/office/powerpoint/2010/main" id="1" dur="indefinite" restart="never" nodeType="tmRoot"/>
+      </p:par>
+    </p:tnLst>
+  </p:timing>
+</p:sld>
+</file>
+
+<file path=ppt/slides/slide12.xml><?xml version="1.0" encoding="utf-8"?>
+<p:sld xmlns:a="http://schemas.openxmlformats.org/drawingml/2006/main" xmlns:r="http://schemas.openxmlformats.org/officeDocument/2006/relationships" xmlns:p="http://schemas.openxmlformats.org/presentationml/2006/main">
+  <p:cSld>
+    <p:spTree>
+      <p:nvGrpSpPr>
+        <p:cNvPr id="1" name=""/>
+        <p:cNvGrpSpPr/>
+        <p:nvPr/>
+      </p:nvGrpSpPr>
+      <p:grpSpPr>
+        <a:xfrm>
+          <a:off x="0" y="0"/>
+          <a:ext cx="0" cy="0"/>
+          <a:chOff x="0" y="0"/>
+          <a:chExt cx="0" cy="0"/>
+        </a:xfrm>
+      </p:grpSpPr>
+      <p:sp>
+        <p:nvSpPr>
+          <p:cNvPr id="2" name="Название 1"/>
+          <p:cNvSpPr>
+            <a:spLocks noGrp="1"/>
+          </p:cNvSpPr>
+          <p:nvPr>
+            <p:ph type="title"/>
+          </p:nvPr>
+        </p:nvSpPr>
+        <p:spPr/>
+        <p:txBody>
+          <a:bodyPr>
+            <a:normAutofit fontScale="90000"/>
+          </a:bodyPr>
+          <a:lstStyle/>
+          <a:p>
+            <a:r>
+              <a:rPr lang="ru-RU" dirty="0" err="1" smtClean="0"/>
+              <a:t>Параметри</a:t>
+            </a:r>
+            <a:r>
+              <a:rPr lang="ru-RU" dirty="0" smtClean="0"/>
+              <a:t> для </a:t>
+            </a:r>
+            <a:r>
+              <a:rPr lang="ru-RU" dirty="0" err="1" smtClean="0"/>
+              <a:t>порівняння</a:t>
+            </a:r>
+            <a:r>
+              <a:rPr lang="ru-RU" dirty="0" smtClean="0"/>
+              <a:t> алгоритму з самим собою</a:t>
+            </a:r>
+            <a:endParaRPr lang="ru-RU" dirty="0"/>
+          </a:p>
+        </p:txBody>
+      </p:sp>
+      <p:sp>
+        <p:nvSpPr>
+          <p:cNvPr id="3" name="Содержимое 2"/>
+          <p:cNvSpPr>
+            <a:spLocks noGrp="1"/>
+          </p:cNvSpPr>
+          <p:nvPr>
+            <p:ph idx="1"/>
+          </p:nvPr>
+        </p:nvSpPr>
+        <p:spPr/>
+        <p:txBody>
+          <a:bodyPr/>
+          <a:lstStyle/>
+          <a:p>
+            <a:r>
+              <a:rPr lang="en-US" sz="2800" dirty="0" smtClean="0"/>
+              <a:t>NUMBER_OF_REVIEWS_TO_ANALY </a:t>
+            </a:r>
+            <a:r>
+              <a:rPr lang="en-US" sz="2800" dirty="0"/>
+              <a:t>ZE = 10000 </a:t>
+            </a:r>
+            <a:r>
+              <a:rPr lang="en-US" sz="2800" dirty="0" smtClean="0"/>
+              <a:t>NUMBER_OF_POPULAR_WORDS_TO</a:t>
+            </a:r>
+            <a:r>
+              <a:rPr lang="uk-UA" sz="2800" dirty="0" smtClean="0"/>
+              <a:t>_</a:t>
+            </a:r>
+            <a:r>
+              <a:rPr lang="en-US" sz="2800" dirty="0" smtClean="0"/>
+              <a:t>USE </a:t>
+            </a:r>
+            <a:r>
+              <a:rPr lang="en-US" sz="2800" dirty="0"/>
+              <a:t>= 1000 </a:t>
+            </a:r>
+            <a:endParaRPr lang="en-US" sz="2800" dirty="0"/>
+          </a:p>
+          <a:p>
+            <a:endParaRPr lang="ru-RU" dirty="0"/>
+          </a:p>
+        </p:txBody>
+      </p:sp>
+    </p:spTree>
+    <p:extLst>
+      <p:ext uri="{BB962C8B-B14F-4D97-AF65-F5344CB8AC3E}">
+        <p14:creationId xmlns:p14="http://schemas.microsoft.com/office/powerpoint/2010/main" val="4155986434"/>
+      </p:ext>
+    </p:extLst>
+  </p:cSld>
+  <p:clrMapOvr>
+    <a:masterClrMapping/>
+  </p:clrMapOvr>
+  <p:timing>
+    <p:tnLst>
+      <p:par>
+        <p:cTn xmlns:p14="http://schemas.microsoft.com/office/powerpoint/2010/main" id="1" dur="indefinite" restart="never" nodeType="tmRoot"/>
+      </p:par>
+    </p:tnLst>
+  </p:timing>
+</p:sld>
+</file>
+
+<file path=ppt/slides/slide13.xml><?xml version="1.0" encoding="utf-8"?>
+<p:sld xmlns:a="http://schemas.openxmlformats.org/drawingml/2006/main" xmlns:r="http://schemas.openxmlformats.org/officeDocument/2006/relationships" xmlns:p="http://schemas.openxmlformats.org/presentationml/2006/main">
+  <p:cSld>
+    <p:spTree>
+      <p:nvGrpSpPr>
+        <p:cNvPr id="1" name=""/>
+        <p:cNvGrpSpPr/>
+        <p:nvPr/>
+      </p:nvGrpSpPr>
+      <p:grpSpPr>
+        <a:xfrm>
+          <a:off x="0" y="0"/>
+          <a:ext cx="0" cy="0"/>
+          <a:chOff x="0" y="0"/>
+          <a:chExt cx="0" cy="0"/>
+        </a:xfrm>
+      </p:grpSpPr>
+      <p:sp>
+        <p:nvSpPr>
+          <p:cNvPr id="2" name="Название 1"/>
+          <p:cNvSpPr>
+            <a:spLocks noGrp="1"/>
+          </p:cNvSpPr>
+          <p:nvPr>
+            <p:ph type="title"/>
+          </p:nvPr>
+        </p:nvSpPr>
+        <p:spPr/>
+        <p:txBody>
+          <a:bodyPr>
+            <a:normAutofit fontScale="90000"/>
+          </a:bodyPr>
+          <a:lstStyle/>
+          <a:p>
+            <a:r>
+              <a:rPr lang="ru-RU" dirty="0" err="1" smtClean="0"/>
+              <a:t>Параметри</a:t>
+            </a:r>
+            <a:r>
+              <a:rPr lang="ru-RU" dirty="0" smtClean="0"/>
+              <a:t> </a:t>
+            </a:r>
+            <a:r>
+              <a:rPr lang="ru-RU" dirty="0" err="1" smtClean="0"/>
+              <a:t>які</a:t>
+            </a:r>
+            <a:r>
+              <a:rPr lang="ru-RU" dirty="0" smtClean="0"/>
+              <a:t> </a:t>
+            </a:r>
+            <a:r>
+              <a:rPr lang="ru-RU" dirty="0" err="1" smtClean="0"/>
+              <a:t>дають</a:t>
+            </a:r>
+            <a:r>
+              <a:rPr lang="ru-RU" dirty="0" smtClean="0"/>
+              <a:t> </a:t>
+            </a:r>
+            <a:r>
+              <a:rPr lang="ru-RU" dirty="0" err="1" smtClean="0"/>
+              <a:t>найкращий</a:t>
+            </a:r>
+            <a:r>
+              <a:rPr lang="ru-RU" dirty="0" smtClean="0"/>
+              <a:t> результат</a:t>
+            </a:r>
+            <a:endParaRPr lang="ru-RU" dirty="0"/>
+          </a:p>
+        </p:txBody>
+      </p:sp>
+      <p:pic>
+        <p:nvPicPr>
+          <p:cNvPr id="4" name="Содержимое 3" descr="Screen Shot 2016-06-06 at 9.34.18 PM.png"/>
+          <p:cNvPicPr>
+            <a:picLocks noGrp="1" noChangeAspect="1"/>
+          </p:cNvPicPr>
+          <p:nvPr>
+            <p:ph idx="1"/>
+          </p:nvPr>
+        </p:nvPicPr>
+        <p:blipFill>
+          <a:blip r:embed="rId2">
+            <a:extLst>
+              <a:ext uri="{28A0092B-C50C-407E-A947-70E740481C1C}">
+                <a14:useLocalDpi xmlns:a14="http://schemas.microsoft.com/office/drawing/2010/main" val="0"/>
+              </a:ext>
+            </a:extLst>
+          </a:blip>
+          <a:srcRect t="-39049" b="-39049"/>
+          <a:stretch>
+            <a:fillRect/>
+          </a:stretch>
+        </p:blipFill>
+        <p:spPr/>
+      </p:pic>
+    </p:spTree>
+    <p:extLst>
+      <p:ext uri="{BB962C8B-B14F-4D97-AF65-F5344CB8AC3E}">
+        <p14:creationId xmlns:p14="http://schemas.microsoft.com/office/powerpoint/2010/main" val="1861919438"/>
+      </p:ext>
+    </p:extLst>
+  </p:cSld>
+  <p:clrMapOvr>
+    <a:masterClrMapping/>
+  </p:clrMapOvr>
+  <p:timing>
+    <p:tnLst>
+      <p:par>
+        <p:cTn xmlns:p14="http://schemas.microsoft.com/office/powerpoint/2010/main" id="1" dur="indefinite" restart="never" nodeType="tmRoot"/>
+      </p:par>
+    </p:tnLst>
+  </p:timing>
+</p:sld>
+</file>
+
+<file path=ppt/slides/slide14.xml><?xml version="1.0" encoding="utf-8"?>
+<p:sld xmlns:a="http://schemas.openxmlformats.org/drawingml/2006/main" xmlns:r="http://schemas.openxmlformats.org/officeDocument/2006/relationships" xmlns:p="http://schemas.openxmlformats.org/presentationml/2006/main">
+  <p:cSld>
+    <p:spTree>
+      <p:nvGrpSpPr>
+        <p:cNvPr id="1" name=""/>
+        <p:cNvGrpSpPr/>
+        <p:nvPr/>
+      </p:nvGrpSpPr>
+      <p:grpSpPr>
+        <a:xfrm>
+          <a:off x="0" y="0"/>
+          <a:ext cx="0" cy="0"/>
+          <a:chOff x="0" y="0"/>
+          <a:chExt cx="0" cy="0"/>
+        </a:xfrm>
+      </p:grpSpPr>
+      <p:sp>
+        <p:nvSpPr>
+          <p:cNvPr id="2" name="Название 1"/>
+          <p:cNvSpPr>
+            <a:spLocks noGrp="1"/>
+          </p:cNvSpPr>
+          <p:nvPr>
+            <p:ph type="title"/>
+          </p:nvPr>
+        </p:nvSpPr>
+        <p:spPr/>
+        <p:txBody>
+          <a:bodyPr/>
+          <a:lstStyle/>
+          <a:p>
+            <a:r>
+              <a:rPr lang="ru-RU" dirty="0" err="1" smtClean="0"/>
+              <a:t>Порівняння</a:t>
+            </a:r>
+            <a:r>
+              <a:rPr lang="ru-RU" dirty="0" smtClean="0"/>
+              <a:t> </a:t>
+            </a:r>
+            <a:r>
+              <a:rPr lang="ru-RU" dirty="0" err="1" smtClean="0"/>
+              <a:t>результатів</a:t>
+            </a:r>
+            <a:endParaRPr lang="ru-RU" dirty="0"/>
+          </a:p>
+        </p:txBody>
+      </p:sp>
+      <p:pic>
+        <p:nvPicPr>
+          <p:cNvPr id="4" name="Содержимое 3" descr="recruiting-software-comparison.jpg"/>
+          <p:cNvPicPr>
+            <a:picLocks noGrp="1" noChangeAspect="1"/>
+          </p:cNvPicPr>
+          <p:nvPr>
+            <p:ph idx="1"/>
+          </p:nvPr>
+        </p:nvPicPr>
+        <p:blipFill>
+          <a:blip r:embed="rId2">
+            <a:extLst>
+              <a:ext uri="{28A0092B-C50C-407E-A947-70E740481C1C}">
+                <a14:useLocalDpi xmlns:a14="http://schemas.microsoft.com/office/drawing/2010/main" val="0"/>
+              </a:ext>
+            </a:extLst>
+          </a:blip>
+          <a:srcRect t="5434" b="5434"/>
+          <a:stretch>
+            <a:fillRect/>
+          </a:stretch>
+        </p:blipFill>
+        <p:spPr/>
+      </p:pic>
+    </p:spTree>
+    <p:extLst>
+      <p:ext uri="{BB962C8B-B14F-4D97-AF65-F5344CB8AC3E}">
+        <p14:creationId xmlns:p14="http://schemas.microsoft.com/office/powerpoint/2010/main" val="2568683319"/>
+      </p:ext>
+    </p:extLst>
+  </p:cSld>
+  <p:clrMapOvr>
+    <a:masterClrMapping/>
+  </p:clrMapOvr>
+  <p:timing>
+    <p:tnLst>
+      <p:par>
+        <p:cTn xmlns:p14="http://schemas.microsoft.com/office/powerpoint/2010/main" id="1" dur="indefinite" restart="never" nodeType="tmRoot"/>
+      </p:par>
+    </p:tnLst>
+  </p:timing>
+</p:sld>
+</file>
+
+<file path=ppt/slides/slide15.xml><?xml version="1.0" encoding="utf-8"?>
+<p:sld xmlns:a="http://schemas.openxmlformats.org/drawingml/2006/main" xmlns:r="http://schemas.openxmlformats.org/officeDocument/2006/relationships" xmlns:p="http://schemas.openxmlformats.org/presentationml/2006/main">
+  <p:cSld>
+    <p:spTree>
+      <p:nvGrpSpPr>
+        <p:cNvPr id="1" name=""/>
+        <p:cNvGrpSpPr/>
+        <p:nvPr/>
+      </p:nvGrpSpPr>
+      <p:grpSpPr>
+        <a:xfrm>
+          <a:off x="0" y="0"/>
+          <a:ext cx="0" cy="0"/>
+          <a:chOff x="0" y="0"/>
+          <a:chExt cx="0" cy="0"/>
+        </a:xfrm>
+      </p:grpSpPr>
+      <p:sp>
+        <p:nvSpPr>
+          <p:cNvPr id="2" name="Название 1"/>
+          <p:cNvSpPr>
+            <a:spLocks noGrp="1"/>
+          </p:cNvSpPr>
+          <p:nvPr>
+            <p:ph type="title"/>
+          </p:nvPr>
+        </p:nvSpPr>
+        <p:spPr/>
+        <p:txBody>
+          <a:bodyPr/>
+          <a:lstStyle/>
+          <a:p>
+            <a:r>
+              <a:rPr lang="en-US" dirty="0" smtClean="0"/>
+              <a:t>Naïve Bayes 80:20</a:t>
+            </a:r>
+            <a:endParaRPr lang="ru-RU" dirty="0"/>
+          </a:p>
+        </p:txBody>
+      </p:sp>
+      <p:pic>
+        <p:nvPicPr>
+          <p:cNvPr id="4" name="Содержимое 3" descr="Screen Shot 2016-06-06 at 10.17.44 PM.png"/>
+          <p:cNvPicPr>
+            <a:picLocks noGrp="1" noChangeAspect="1"/>
+          </p:cNvPicPr>
+          <p:nvPr>
+            <p:ph idx="1"/>
+          </p:nvPr>
+        </p:nvPicPr>
+        <p:blipFill>
+          <a:blip r:embed="rId2">
+            <a:extLst>
+              <a:ext uri="{28A0092B-C50C-407E-A947-70E740481C1C}">
+                <a14:useLocalDpi xmlns:a14="http://schemas.microsoft.com/office/drawing/2010/main" val="0"/>
+              </a:ext>
+            </a:extLst>
+          </a:blip>
+          <a:srcRect l="-15547" r="-15547"/>
+          <a:stretch>
+            <a:fillRect/>
+          </a:stretch>
+        </p:blipFill>
+        <p:spPr/>
+      </p:pic>
+    </p:spTree>
+    <p:extLst>
+      <p:ext uri="{BB962C8B-B14F-4D97-AF65-F5344CB8AC3E}">
+        <p14:creationId xmlns:p14="http://schemas.microsoft.com/office/powerpoint/2010/main" val="3445112494"/>
+      </p:ext>
+    </p:extLst>
+  </p:cSld>
+  <p:clrMapOvr>
+    <a:masterClrMapping/>
+  </p:clrMapOvr>
+  <p:timing>
+    <p:tnLst>
+      <p:par>
+        <p:cTn xmlns:p14="http://schemas.microsoft.com/office/powerpoint/2010/main" id="1" dur="indefinite" restart="never" nodeType="tmRoot"/>
+      </p:par>
+    </p:tnLst>
+  </p:timing>
+</p:sld>
+</file>
+
+<file path=ppt/slides/slide16.xml><?xml version="1.0" encoding="utf-8"?>
+<p:sld xmlns:a="http://schemas.openxmlformats.org/drawingml/2006/main" xmlns:r="http://schemas.openxmlformats.org/officeDocument/2006/relationships" xmlns:p="http://schemas.openxmlformats.org/presentationml/2006/main">
+  <p:cSld>
+    <p:spTree>
+      <p:nvGrpSpPr>
+        <p:cNvPr id="1" name=""/>
+        <p:cNvGrpSpPr/>
+        <p:nvPr/>
+      </p:nvGrpSpPr>
+      <p:grpSpPr>
+        <a:xfrm>
+          <a:off x="0" y="0"/>
+          <a:ext cx="0" cy="0"/>
+          <a:chOff x="0" y="0"/>
+          <a:chExt cx="0" cy="0"/>
+        </a:xfrm>
+      </p:grpSpPr>
+      <p:sp>
+        <p:nvSpPr>
+          <p:cNvPr id="2" name="Название 1"/>
+          <p:cNvSpPr>
+            <a:spLocks noGrp="1"/>
+          </p:cNvSpPr>
+          <p:nvPr>
+            <p:ph type="title"/>
+          </p:nvPr>
+        </p:nvSpPr>
+        <p:spPr/>
+        <p:txBody>
+          <a:bodyPr/>
+          <a:lstStyle/>
+          <a:p>
+            <a:r>
+              <a:rPr lang="en-US" dirty="0"/>
+              <a:t>Naïve Bayes </a:t>
+            </a:r>
+            <a:r>
+              <a:rPr lang="en-US" dirty="0" smtClean="0"/>
+              <a:t>60:40</a:t>
+            </a:r>
+            <a:endParaRPr lang="ru-RU" dirty="0"/>
+          </a:p>
+        </p:txBody>
+      </p:sp>
+      <p:pic>
+        <p:nvPicPr>
+          <p:cNvPr id="4" name="Содержимое 3" descr="Screen Shot 2016-06-06 at 10.21.25 PM.png"/>
+          <p:cNvPicPr>
+            <a:picLocks noGrp="1" noChangeAspect="1"/>
+          </p:cNvPicPr>
+          <p:nvPr>
+            <p:ph idx="1"/>
+          </p:nvPr>
+        </p:nvPicPr>
+        <p:blipFill>
+          <a:blip r:embed="rId2">
+            <a:extLst>
+              <a:ext uri="{28A0092B-C50C-407E-A947-70E740481C1C}">
+                <a14:useLocalDpi xmlns:a14="http://schemas.microsoft.com/office/drawing/2010/main" val="0"/>
+              </a:ext>
+            </a:extLst>
+          </a:blip>
+          <a:srcRect l="-13685" r="-13685"/>
+          <a:stretch>
+            <a:fillRect/>
+          </a:stretch>
+        </p:blipFill>
+        <p:spPr/>
+      </p:pic>
+    </p:spTree>
+    <p:extLst>
+      <p:ext uri="{BB962C8B-B14F-4D97-AF65-F5344CB8AC3E}">
+        <p14:creationId xmlns:p14="http://schemas.microsoft.com/office/powerpoint/2010/main" val="168090422"/>
+      </p:ext>
+    </p:extLst>
+  </p:cSld>
+  <p:clrMapOvr>
+    <a:masterClrMapping/>
+  </p:clrMapOvr>
+  <p:timing>
+    <p:tnLst>
+      <p:par>
+        <p:cTn xmlns:p14="http://schemas.microsoft.com/office/powerpoint/2010/main" id="1" dur="indefinite" restart="never" nodeType="tmRoot"/>
+      </p:par>
+    </p:tnLst>
+  </p:timing>
+</p:sld>
+</file>
+
+<file path=ppt/slides/slide17.xml><?xml version="1.0" encoding="utf-8"?>
+<p:sld xmlns:a="http://schemas.openxmlformats.org/drawingml/2006/main" xmlns:r="http://schemas.openxmlformats.org/officeDocument/2006/relationships" xmlns:p="http://schemas.openxmlformats.org/presentationml/2006/main">
+  <p:cSld>
+    <p:spTree>
+      <p:nvGrpSpPr>
+        <p:cNvPr id="1" name=""/>
+        <p:cNvGrpSpPr/>
+        <p:nvPr/>
+      </p:nvGrpSpPr>
+      <p:grpSpPr>
+        <a:xfrm>
+          <a:off x="0" y="0"/>
+          <a:ext cx="0" cy="0"/>
+          <a:chOff x="0" y="0"/>
+          <a:chExt cx="0" cy="0"/>
+        </a:xfrm>
+      </p:grpSpPr>
+      <p:sp>
+        <p:nvSpPr>
+          <p:cNvPr id="2" name="Название 1"/>
+          <p:cNvSpPr>
+            <a:spLocks noGrp="1"/>
+          </p:cNvSpPr>
+          <p:nvPr>
+            <p:ph type="title"/>
+          </p:nvPr>
+        </p:nvSpPr>
+        <p:spPr/>
+        <p:txBody>
+          <a:bodyPr/>
+          <a:lstStyle/>
+          <a:p>
+            <a:r>
+              <a:rPr lang="en-US" dirty="0" smtClean="0"/>
+              <a:t>Logistic regression 80:20</a:t>
+            </a:r>
+            <a:endParaRPr lang="ru-RU" dirty="0"/>
+          </a:p>
+        </p:txBody>
+      </p:sp>
+      <p:pic>
+        <p:nvPicPr>
+          <p:cNvPr id="4" name="Содержимое 3" descr="Screen Shot 2016-06-06 at 10.19.03 PM.png"/>
+          <p:cNvPicPr>
+            <a:picLocks noGrp="1" noChangeAspect="1"/>
+          </p:cNvPicPr>
+          <p:nvPr>
+            <p:ph idx="1"/>
+          </p:nvPr>
+        </p:nvPicPr>
+        <p:blipFill>
+          <a:blip r:embed="rId2">
+            <a:extLst>
+              <a:ext uri="{28A0092B-C50C-407E-A947-70E740481C1C}">
+                <a14:useLocalDpi xmlns:a14="http://schemas.microsoft.com/office/drawing/2010/main" val="0"/>
+              </a:ext>
+            </a:extLst>
+          </a:blip>
+          <a:srcRect l="-15914" r="-15914"/>
+          <a:stretch>
+            <a:fillRect/>
+          </a:stretch>
+        </p:blipFill>
+        <p:spPr/>
+      </p:pic>
+    </p:spTree>
+    <p:extLst>
+      <p:ext uri="{BB962C8B-B14F-4D97-AF65-F5344CB8AC3E}">
+        <p14:creationId xmlns:p14="http://schemas.microsoft.com/office/powerpoint/2010/main" val="1496279945"/>
+      </p:ext>
+    </p:extLst>
+  </p:cSld>
+  <p:clrMapOvr>
+    <a:masterClrMapping/>
+  </p:clrMapOvr>
+  <p:timing>
+    <p:tnLst>
+      <p:par>
+        <p:cTn xmlns:p14="http://schemas.microsoft.com/office/powerpoint/2010/main" id="1" dur="indefinite" restart="never" nodeType="tmRoot"/>
+      </p:par>
+    </p:tnLst>
+  </p:timing>
+</p:sld>
+</file>
+
+<file path=ppt/slides/slide18.xml><?xml version="1.0" encoding="utf-8"?>
+<p:sld xmlns:a="http://schemas.openxmlformats.org/drawingml/2006/main" xmlns:r="http://schemas.openxmlformats.org/officeDocument/2006/relationships" xmlns:p="http://schemas.openxmlformats.org/presentationml/2006/main">
+  <p:cSld>
+    <p:spTree>
+      <p:nvGrpSpPr>
+        <p:cNvPr id="1" name=""/>
+        <p:cNvGrpSpPr/>
+        <p:nvPr/>
+      </p:nvGrpSpPr>
+      <p:grpSpPr>
+        <a:xfrm>
+          <a:off x="0" y="0"/>
+          <a:ext cx="0" cy="0"/>
+          <a:chOff x="0" y="0"/>
+          <a:chExt cx="0" cy="0"/>
+        </a:xfrm>
+      </p:grpSpPr>
+      <p:sp>
+        <p:nvSpPr>
+          <p:cNvPr id="2" name="Название 1"/>
+          <p:cNvSpPr>
+            <a:spLocks noGrp="1"/>
+          </p:cNvSpPr>
+          <p:nvPr>
+            <p:ph type="title"/>
+          </p:nvPr>
+        </p:nvSpPr>
+        <p:spPr/>
+        <p:txBody>
+          <a:bodyPr/>
+          <a:lstStyle/>
+          <a:p>
+            <a:r>
+              <a:rPr lang="en-US" dirty="0"/>
+              <a:t>Logistic regression </a:t>
+            </a:r>
+            <a:r>
+              <a:rPr lang="en-US" dirty="0" smtClean="0"/>
+              <a:t>60:40</a:t>
+            </a:r>
+            <a:endParaRPr lang="ru-RU" dirty="0"/>
+          </a:p>
+        </p:txBody>
+      </p:sp>
+      <p:pic>
+        <p:nvPicPr>
+          <p:cNvPr id="6" name="Содержимое 5" descr="Screen Shot 2016-06-06 at 10.23.33 PM.png"/>
+          <p:cNvPicPr>
+            <a:picLocks noGrp="1" noChangeAspect="1"/>
+          </p:cNvPicPr>
+          <p:nvPr>
+            <p:ph idx="1"/>
+          </p:nvPr>
+        </p:nvPicPr>
+        <p:blipFill>
+          <a:blip r:embed="rId2">
+            <a:extLst>
+              <a:ext uri="{28A0092B-C50C-407E-A947-70E740481C1C}">
+                <a14:useLocalDpi xmlns:a14="http://schemas.microsoft.com/office/drawing/2010/main" val="0"/>
+              </a:ext>
+            </a:extLst>
+          </a:blip>
+          <a:srcRect l="-13467" r="-13467"/>
+          <a:stretch>
+            <a:fillRect/>
+          </a:stretch>
+        </p:blipFill>
+        <p:spPr/>
+      </p:pic>
+    </p:spTree>
+    <p:extLst>
+      <p:ext uri="{BB962C8B-B14F-4D97-AF65-F5344CB8AC3E}">
+        <p14:creationId xmlns:p14="http://schemas.microsoft.com/office/powerpoint/2010/main" val="475604849"/>
+      </p:ext>
+    </p:extLst>
+  </p:cSld>
+  <p:clrMapOvr>
+    <a:masterClrMapping/>
+  </p:clrMapOvr>
+  <p:timing>
+    <p:tnLst>
+      <p:par>
+        <p:cTn xmlns:p14="http://schemas.microsoft.com/office/powerpoint/2010/main" id="1" dur="indefinite" restart="never" nodeType="tmRoot"/>
+      </p:par>
+    </p:tnLst>
+  </p:timing>
+</p:sld>
+</file>
+
+<file path=ppt/slides/slide19.xml><?xml version="1.0" encoding="utf-8"?>
+<p:sld xmlns:a="http://schemas.openxmlformats.org/drawingml/2006/main" xmlns:r="http://schemas.openxmlformats.org/officeDocument/2006/relationships" xmlns:p="http://schemas.openxmlformats.org/presentationml/2006/main">
+  <p:cSld>
+    <p:spTree>
+      <p:nvGrpSpPr>
+        <p:cNvPr id="1" name=""/>
+        <p:cNvGrpSpPr/>
+        <p:nvPr/>
+      </p:nvGrpSpPr>
+      <p:grpSpPr>
+        <a:xfrm>
+          <a:off x="0" y="0"/>
+          <a:ext cx="0" cy="0"/>
+          <a:chOff x="0" y="0"/>
+          <a:chExt cx="0" cy="0"/>
+        </a:xfrm>
+      </p:grpSpPr>
+      <p:sp>
+        <p:nvSpPr>
+          <p:cNvPr id="2" name="Название 1"/>
+          <p:cNvSpPr>
+            <a:spLocks noGrp="1"/>
+          </p:cNvSpPr>
+          <p:nvPr>
+            <p:ph type="title"/>
+          </p:nvPr>
+        </p:nvSpPr>
+        <p:spPr/>
+        <p:txBody>
+          <a:bodyPr/>
+          <a:lstStyle/>
+          <a:p>
+            <a:r>
+              <a:rPr lang="en-US" dirty="0" smtClean="0"/>
+              <a:t>KNN 80:20</a:t>
+            </a:r>
+            <a:endParaRPr lang="ru-RU" dirty="0"/>
+          </a:p>
+        </p:txBody>
+      </p:sp>
+      <p:pic>
+        <p:nvPicPr>
+          <p:cNvPr id="4" name="Содержимое 3" descr="Screen Shot 2016-06-06 at 10.20.16 PM.png"/>
+          <p:cNvPicPr>
+            <a:picLocks noGrp="1" noChangeAspect="1"/>
+          </p:cNvPicPr>
+          <p:nvPr>
+            <p:ph idx="1"/>
+          </p:nvPr>
+        </p:nvPicPr>
+        <p:blipFill>
+          <a:blip r:embed="rId2">
+            <a:extLst>
+              <a:ext uri="{28A0092B-C50C-407E-A947-70E740481C1C}">
+                <a14:useLocalDpi xmlns:a14="http://schemas.microsoft.com/office/drawing/2010/main" val="0"/>
+              </a:ext>
+            </a:extLst>
+          </a:blip>
+          <a:srcRect l="-14897" r="-14897"/>
+          <a:stretch>
+            <a:fillRect/>
+          </a:stretch>
+        </p:blipFill>
+        <p:spPr/>
+      </p:pic>
+    </p:spTree>
+    <p:extLst>
+      <p:ext uri="{BB962C8B-B14F-4D97-AF65-F5344CB8AC3E}">
+        <p14:creationId xmlns:p14="http://schemas.microsoft.com/office/powerpoint/2010/main" val="3996249196"/>
       </p:ext>
     </p:extLst>
   </p:cSld>
@@ -3895,7 +4647,9 @@
         </p:nvSpPr>
         <p:spPr/>
         <p:txBody>
-          <a:bodyPr/>
+          <a:bodyPr>
+            <a:normAutofit lnSpcReduction="10000"/>
+          </a:bodyPr>
           <a:lstStyle/>
           <a:p>
             <a:r>
@@ -3918,11 +4672,82 @@
               <a:rPr lang="ru-RU" dirty="0" err="1" smtClean="0"/>
               <a:t>підходи</a:t>
             </a:r>
+            <a:r>
+              <a:rPr lang="ru-RU" dirty="0" smtClean="0"/>
+              <a:t> до </a:t>
+            </a:r>
+            <a:r>
+              <a:rPr lang="ru-RU" dirty="0" err="1" smtClean="0"/>
+              <a:t>аналізу</a:t>
+            </a:r>
+            <a:r>
+              <a:rPr lang="ru-RU" dirty="0" smtClean="0"/>
+              <a:t> </a:t>
+            </a:r>
+            <a:r>
+              <a:rPr lang="ru-RU" dirty="0" err="1" smtClean="0"/>
+              <a:t>сентиментів</a:t>
+            </a:r>
             <a:endParaRPr lang="ru-RU" dirty="0" smtClean="0"/>
           </a:p>
           <a:p>
             <a:r>
               <a:rPr lang="ru-RU" dirty="0" err="1" smtClean="0"/>
+              <a:t>Оцінити</a:t>
+            </a:r>
+            <a:r>
+              <a:rPr lang="ru-RU" dirty="0" smtClean="0"/>
+              <a:t> як </a:t>
+            </a:r>
+            <a:r>
+              <a:rPr lang="ru-RU" dirty="0" err="1" smtClean="0"/>
+              <a:t>змінится</a:t>
+            </a:r>
+            <a:r>
+              <a:rPr lang="ru-RU" dirty="0" smtClean="0"/>
+              <a:t> </a:t>
+            </a:r>
+            <a:r>
+              <a:rPr lang="ru-RU" dirty="0" err="1" smtClean="0"/>
+              <a:t>якість</a:t>
+            </a:r>
+            <a:r>
+              <a:rPr lang="ru-RU" dirty="0" smtClean="0"/>
+              <a:t> </a:t>
+            </a:r>
+            <a:r>
+              <a:rPr lang="ru-RU" dirty="0" err="1" smtClean="0"/>
+              <a:t>прогнозування</a:t>
+            </a:r>
+            <a:r>
+              <a:rPr lang="ru-RU" dirty="0" smtClean="0"/>
+              <a:t> при </a:t>
+            </a:r>
+            <a:r>
+              <a:rPr lang="ru-RU" dirty="0" err="1" smtClean="0"/>
+              <a:t>збільшенні</a:t>
+            </a:r>
+            <a:r>
+              <a:rPr lang="ru-RU" dirty="0" smtClean="0"/>
+              <a:t> </a:t>
+            </a:r>
+            <a:r>
+              <a:rPr lang="ru-RU" dirty="0" err="1" smtClean="0"/>
+              <a:t>кількості</a:t>
+            </a:r>
+            <a:r>
+              <a:rPr lang="ru-RU" dirty="0" smtClean="0"/>
+              <a:t> </a:t>
+            </a:r>
+            <a:r>
+              <a:rPr lang="ru-RU" dirty="0" err="1" smtClean="0"/>
+              <a:t>класів</a:t>
+            </a:r>
+            <a:endParaRPr lang="ru-RU" dirty="0" smtClean="0"/>
+          </a:p>
+          <a:p>
+            <a:r>
+              <a:rPr lang="ru-RU" dirty="0" err="1" smtClean="0"/>
               <a:t>Створити</a:t>
             </a:r>
             <a:r>
@@ -3951,21 +4776,15 @@
             </a:r>
             <a:r>
               <a:rPr lang="ru-RU" dirty="0" smtClean="0"/>
-              <a:t> результат</a:t>
-            </a:r>
-          </a:p>
-          <a:p>
-            <a:r>
-              <a:rPr lang="ru-RU" dirty="0" err="1" smtClean="0"/>
-              <a:t>Розробити</a:t>
-            </a:r>
-            <a:r>
-              <a:rPr lang="ru-RU" dirty="0" smtClean="0"/>
               <a:t> </a:t>
             </a:r>
             <a:r>
-              <a:rPr lang="ru-RU" dirty="0" err="1" smtClean="0"/>
-              <a:t>програмний</a:t>
+              <a:rPr lang="ru-RU" dirty="0" smtClean="0"/>
+              <a:t>результат при </a:t>
+            </a:r>
+            <a:r>
+              <a:rPr lang="ru-RU" dirty="0" err="1" smtClean="0"/>
+              <a:t>більшій</a:t>
             </a:r>
             <a:r>
               <a:rPr lang="ru-RU" dirty="0" smtClean="0"/>
@@ -3973,7 +4792,46 @@
             </a:r>
             <a:r>
               <a:rPr lang="ru-RU" dirty="0" err="1" smtClean="0"/>
-              <a:t>застосунок</a:t>
+              <a:t>кількості</a:t>
+            </a:r>
+            <a:r>
+              <a:rPr lang="ru-RU" dirty="0" smtClean="0"/>
+              <a:t> </a:t>
+            </a:r>
+            <a:r>
+              <a:rPr lang="ru-RU" dirty="0" err="1" smtClean="0"/>
+              <a:t>классів</a:t>
+            </a:r>
+            <a:endParaRPr lang="ru-RU" dirty="0" smtClean="0"/>
+          </a:p>
+          <a:p>
+            <a:r>
+              <a:rPr lang="ru-RU" dirty="0" err="1" smtClean="0"/>
+              <a:t>Реалізувати</a:t>
+            </a:r>
+            <a:r>
+              <a:rPr lang="ru-RU" dirty="0" smtClean="0"/>
+              <a:t> </a:t>
+            </a:r>
+            <a:r>
+              <a:rPr lang="ru-RU" dirty="0" err="1" smtClean="0"/>
+              <a:t>модифікацію</a:t>
+            </a:r>
+            <a:r>
+              <a:rPr lang="ru-RU" dirty="0" smtClean="0"/>
+              <a:t> у </a:t>
+            </a:r>
+            <a:r>
+              <a:rPr lang="ru-RU" dirty="0" err="1" smtClean="0"/>
+              <a:t>програмному</a:t>
+            </a:r>
+            <a:r>
+              <a:rPr lang="ru-RU" dirty="0" smtClean="0"/>
+              <a:t> </a:t>
+            </a:r>
+            <a:r>
+              <a:rPr lang="ru-RU" dirty="0" err="1" smtClean="0"/>
+              <a:t>застосунку</a:t>
             </a:r>
             <a:endParaRPr lang="ru-RU" dirty="0"/>
           </a:p>
@@ -3983,6 +4841,1351 @@
     <p:extLst>
       <p:ext uri="{BB962C8B-B14F-4D97-AF65-F5344CB8AC3E}">
         <p14:creationId xmlns:p14="http://schemas.microsoft.com/office/powerpoint/2010/main" val="529716088"/>
+      </p:ext>
+    </p:extLst>
+  </p:cSld>
+  <p:clrMapOvr>
+    <a:masterClrMapping/>
+  </p:clrMapOvr>
+  <p:timing>
+    <p:tnLst>
+      <p:par>
+        <p:cTn xmlns:p14="http://schemas.microsoft.com/office/powerpoint/2010/main" id="1" dur="indefinite" restart="never" nodeType="tmRoot"/>
+      </p:par>
+    </p:tnLst>
+  </p:timing>
+</p:sld>
+</file>
+
+<file path=ppt/slides/slide20.xml><?xml version="1.0" encoding="utf-8"?>
+<p:sld xmlns:a="http://schemas.openxmlformats.org/drawingml/2006/main" xmlns:r="http://schemas.openxmlformats.org/officeDocument/2006/relationships" xmlns:p="http://schemas.openxmlformats.org/presentationml/2006/main">
+  <p:cSld>
+    <p:spTree>
+      <p:nvGrpSpPr>
+        <p:cNvPr id="1" name=""/>
+        <p:cNvGrpSpPr/>
+        <p:nvPr/>
+      </p:nvGrpSpPr>
+      <p:grpSpPr>
+        <a:xfrm>
+          <a:off x="0" y="0"/>
+          <a:ext cx="0" cy="0"/>
+          <a:chOff x="0" y="0"/>
+          <a:chExt cx="0" cy="0"/>
+        </a:xfrm>
+      </p:grpSpPr>
+      <p:sp>
+        <p:nvSpPr>
+          <p:cNvPr id="2" name="Название 1"/>
+          <p:cNvSpPr>
+            <a:spLocks noGrp="1"/>
+          </p:cNvSpPr>
+          <p:nvPr>
+            <p:ph type="title"/>
+          </p:nvPr>
+        </p:nvSpPr>
+        <p:spPr/>
+        <p:txBody>
+          <a:bodyPr>
+            <a:normAutofit fontScale="90000"/>
+          </a:bodyPr>
+          <a:lstStyle/>
+          <a:p>
+            <a:r>
+              <a:rPr lang="ru-RU" dirty="0" err="1" smtClean="0"/>
+              <a:t>Порівняння</a:t>
+            </a:r>
+            <a:r>
+              <a:rPr lang="ru-RU" dirty="0" smtClean="0"/>
+              <a:t> з </a:t>
+            </a:r>
+            <a:r>
+              <a:rPr lang="ru-RU" dirty="0" err="1" smtClean="0"/>
+              <a:t>іншими</a:t>
+            </a:r>
+            <a:r>
+              <a:rPr lang="ru-RU" dirty="0" smtClean="0"/>
+              <a:t> </a:t>
+            </a:r>
+            <a:r>
+              <a:rPr lang="ru-RU" dirty="0" err="1" smtClean="0"/>
+              <a:t>алгоритамами</a:t>
+            </a:r>
+            <a:endParaRPr lang="ru-RU" dirty="0"/>
+          </a:p>
+        </p:txBody>
+      </p:sp>
+      <p:pic>
+        <p:nvPicPr>
+          <p:cNvPr id="4" name="Содержимое 3" descr="images.jpeg"/>
+          <p:cNvPicPr>
+            <a:picLocks noGrp="1" noChangeAspect="1"/>
+          </p:cNvPicPr>
+          <p:nvPr>
+            <p:ph idx="1"/>
+          </p:nvPr>
+        </p:nvPicPr>
+        <p:blipFill>
+          <a:blip r:embed="rId2">
+            <a:extLst>
+              <a:ext uri="{28A0092B-C50C-407E-A947-70E740481C1C}">
+                <a14:useLocalDpi xmlns:a14="http://schemas.microsoft.com/office/drawing/2010/main" val="0"/>
+              </a:ext>
+            </a:extLst>
+          </a:blip>
+          <a:srcRect l="-30984" r="-30984"/>
+          <a:stretch>
+            <a:fillRect/>
+          </a:stretch>
+        </p:blipFill>
+        <p:spPr/>
+      </p:pic>
+    </p:spTree>
+    <p:extLst>
+      <p:ext uri="{BB962C8B-B14F-4D97-AF65-F5344CB8AC3E}">
+        <p14:creationId xmlns:p14="http://schemas.microsoft.com/office/powerpoint/2010/main" val="2945593644"/>
+      </p:ext>
+    </p:extLst>
+  </p:cSld>
+  <p:clrMapOvr>
+    <a:masterClrMapping/>
+  </p:clrMapOvr>
+  <p:timing>
+    <p:tnLst>
+      <p:par>
+        <p:cTn xmlns:p14="http://schemas.microsoft.com/office/powerpoint/2010/main" id="1" dur="indefinite" restart="never" nodeType="tmRoot"/>
+      </p:par>
+    </p:tnLst>
+  </p:timing>
+</p:sld>
+</file>
+
+<file path=ppt/slides/slide21.xml><?xml version="1.0" encoding="utf-8"?>
+<p:sld xmlns:a="http://schemas.openxmlformats.org/drawingml/2006/main" xmlns:r="http://schemas.openxmlformats.org/officeDocument/2006/relationships" xmlns:p="http://schemas.openxmlformats.org/presentationml/2006/main">
+  <p:cSld>
+    <p:spTree>
+      <p:nvGrpSpPr>
+        <p:cNvPr id="1" name=""/>
+        <p:cNvGrpSpPr/>
+        <p:nvPr/>
+      </p:nvGrpSpPr>
+      <p:grpSpPr>
+        <a:xfrm>
+          <a:off x="0" y="0"/>
+          <a:ext cx="0" cy="0"/>
+          <a:chOff x="0" y="0"/>
+          <a:chExt cx="0" cy="0"/>
+        </a:xfrm>
+      </p:grpSpPr>
+      <p:sp>
+        <p:nvSpPr>
+          <p:cNvPr id="2" name="Название 1"/>
+          <p:cNvSpPr>
+            <a:spLocks noGrp="1"/>
+          </p:cNvSpPr>
+          <p:nvPr>
+            <p:ph type="title"/>
+          </p:nvPr>
+        </p:nvSpPr>
+        <p:spPr/>
+        <p:txBody>
+          <a:bodyPr/>
+          <a:lstStyle/>
+          <a:p>
+            <a:r>
+              <a:rPr lang="uk-UA" dirty="0" smtClean="0"/>
+              <a:t>Параметри алгоритму</a:t>
+            </a:r>
+            <a:endParaRPr lang="ru-RU" dirty="0"/>
+          </a:p>
+        </p:txBody>
+      </p:sp>
+      <p:pic>
+        <p:nvPicPr>
+          <p:cNvPr id="6" name="Содержимое 5" descr="Screen Shot 2016-06-06 at 10.26.41 PM.png"/>
+          <p:cNvPicPr>
+            <a:picLocks noGrp="1" noChangeAspect="1"/>
+          </p:cNvPicPr>
+          <p:nvPr>
+            <p:ph idx="1"/>
+          </p:nvPr>
+        </p:nvPicPr>
+        <p:blipFill>
+          <a:blip r:embed="rId2">
+            <a:extLst>
+              <a:ext uri="{28A0092B-C50C-407E-A947-70E740481C1C}">
+                <a14:useLocalDpi xmlns:a14="http://schemas.microsoft.com/office/drawing/2010/main" val="0"/>
+              </a:ext>
+            </a:extLst>
+          </a:blip>
+          <a:srcRect t="-31997" b="-31997"/>
+          <a:stretch>
+            <a:fillRect/>
+          </a:stretch>
+        </p:blipFill>
+        <p:spPr/>
+      </p:pic>
+    </p:spTree>
+    <p:extLst>
+      <p:ext uri="{BB962C8B-B14F-4D97-AF65-F5344CB8AC3E}">
+        <p14:creationId xmlns:p14="http://schemas.microsoft.com/office/powerpoint/2010/main" val="1732786716"/>
+      </p:ext>
+    </p:extLst>
+  </p:cSld>
+  <p:clrMapOvr>
+    <a:masterClrMapping/>
+  </p:clrMapOvr>
+  <p:timing>
+    <p:tnLst>
+      <p:par>
+        <p:cTn xmlns:p14="http://schemas.microsoft.com/office/powerpoint/2010/main" id="1" dur="indefinite" restart="never" nodeType="tmRoot"/>
+      </p:par>
+    </p:tnLst>
+  </p:timing>
+</p:sld>
+</file>
+
+<file path=ppt/slides/slide22.xml><?xml version="1.0" encoding="utf-8"?>
+<p:sld xmlns:a="http://schemas.openxmlformats.org/drawingml/2006/main" xmlns:r="http://schemas.openxmlformats.org/officeDocument/2006/relationships" xmlns:p="http://schemas.openxmlformats.org/presentationml/2006/main">
+  <p:cSld>
+    <p:spTree>
+      <p:nvGrpSpPr>
+        <p:cNvPr id="1" name=""/>
+        <p:cNvGrpSpPr/>
+        <p:nvPr/>
+      </p:nvGrpSpPr>
+      <p:grpSpPr>
+        <a:xfrm>
+          <a:off x="0" y="0"/>
+          <a:ext cx="0" cy="0"/>
+          <a:chOff x="0" y="0"/>
+          <a:chExt cx="0" cy="0"/>
+        </a:xfrm>
+      </p:grpSpPr>
+      <p:sp>
+        <p:nvSpPr>
+          <p:cNvPr id="2" name="Название 1"/>
+          <p:cNvSpPr>
+            <a:spLocks noGrp="1"/>
+          </p:cNvSpPr>
+          <p:nvPr>
+            <p:ph type="title"/>
+          </p:nvPr>
+        </p:nvSpPr>
+        <p:spPr/>
+        <p:txBody>
+          <a:bodyPr/>
+          <a:lstStyle/>
+          <a:p>
+            <a:r>
+              <a:rPr lang="en-US" dirty="0" smtClean="0"/>
+              <a:t>Naïve Bayes</a:t>
+            </a:r>
+            <a:endParaRPr lang="ru-RU" dirty="0"/>
+          </a:p>
+        </p:txBody>
+      </p:sp>
+      <p:pic>
+        <p:nvPicPr>
+          <p:cNvPr id="4" name="Содержимое 3" descr="Screen Shot 2016-06-06 at 10.28.06 PM.png"/>
+          <p:cNvPicPr>
+            <a:picLocks noGrp="1" noChangeAspect="1"/>
+          </p:cNvPicPr>
+          <p:nvPr>
+            <p:ph idx="1"/>
+          </p:nvPr>
+        </p:nvPicPr>
+        <p:blipFill>
+          <a:blip r:embed="rId2">
+            <a:extLst>
+              <a:ext uri="{28A0092B-C50C-407E-A947-70E740481C1C}">
+                <a14:useLocalDpi xmlns:a14="http://schemas.microsoft.com/office/drawing/2010/main" val="0"/>
+              </a:ext>
+            </a:extLst>
+          </a:blip>
+          <a:srcRect l="-19437" r="-19437"/>
+          <a:stretch>
+            <a:fillRect/>
+          </a:stretch>
+        </p:blipFill>
+        <p:spPr/>
+      </p:pic>
+    </p:spTree>
+    <p:extLst>
+      <p:ext uri="{BB962C8B-B14F-4D97-AF65-F5344CB8AC3E}">
+        <p14:creationId xmlns:p14="http://schemas.microsoft.com/office/powerpoint/2010/main" val="2008915969"/>
+      </p:ext>
+    </p:extLst>
+  </p:cSld>
+  <p:clrMapOvr>
+    <a:masterClrMapping/>
+  </p:clrMapOvr>
+  <p:timing>
+    <p:tnLst>
+      <p:par>
+        <p:cTn xmlns:p14="http://schemas.microsoft.com/office/powerpoint/2010/main" id="1" dur="indefinite" restart="never" nodeType="tmRoot"/>
+      </p:par>
+    </p:tnLst>
+  </p:timing>
+</p:sld>
+</file>
+
+<file path=ppt/slides/slide23.xml><?xml version="1.0" encoding="utf-8"?>
+<p:sld xmlns:a="http://schemas.openxmlformats.org/drawingml/2006/main" xmlns:r="http://schemas.openxmlformats.org/officeDocument/2006/relationships" xmlns:p="http://schemas.openxmlformats.org/presentationml/2006/main">
+  <p:cSld>
+    <p:spTree>
+      <p:nvGrpSpPr>
+        <p:cNvPr id="1" name=""/>
+        <p:cNvGrpSpPr/>
+        <p:nvPr/>
+      </p:nvGrpSpPr>
+      <p:grpSpPr>
+        <a:xfrm>
+          <a:off x="0" y="0"/>
+          <a:ext cx="0" cy="0"/>
+          <a:chOff x="0" y="0"/>
+          <a:chExt cx="0" cy="0"/>
+        </a:xfrm>
+      </p:grpSpPr>
+      <p:sp>
+        <p:nvSpPr>
+          <p:cNvPr id="2" name="Название 1"/>
+          <p:cNvSpPr>
+            <a:spLocks noGrp="1"/>
+          </p:cNvSpPr>
+          <p:nvPr>
+            <p:ph type="title"/>
+          </p:nvPr>
+        </p:nvSpPr>
+        <p:spPr/>
+        <p:txBody>
+          <a:bodyPr/>
+          <a:lstStyle/>
+          <a:p>
+            <a:r>
+              <a:rPr lang="en-US" dirty="0" smtClean="0"/>
+              <a:t>Logistic regression</a:t>
+            </a:r>
+            <a:endParaRPr lang="ru-RU" dirty="0"/>
+          </a:p>
+        </p:txBody>
+      </p:sp>
+      <p:pic>
+        <p:nvPicPr>
+          <p:cNvPr id="4" name="Содержимое 3" descr="Screen Shot 2016-06-06 at 10.28.59 PM.png"/>
+          <p:cNvPicPr>
+            <a:picLocks noGrp="1" noChangeAspect="1"/>
+          </p:cNvPicPr>
+          <p:nvPr>
+            <p:ph idx="1"/>
+          </p:nvPr>
+        </p:nvPicPr>
+        <p:blipFill>
+          <a:blip r:embed="rId2">
+            <a:extLst>
+              <a:ext uri="{28A0092B-C50C-407E-A947-70E740481C1C}">
+                <a14:useLocalDpi xmlns:a14="http://schemas.microsoft.com/office/drawing/2010/main" val="0"/>
+              </a:ext>
+            </a:extLst>
+          </a:blip>
+          <a:srcRect l="-17821" r="-17821"/>
+          <a:stretch>
+            <a:fillRect/>
+          </a:stretch>
+        </p:blipFill>
+        <p:spPr/>
+      </p:pic>
+    </p:spTree>
+    <p:extLst>
+      <p:ext uri="{BB962C8B-B14F-4D97-AF65-F5344CB8AC3E}">
+        <p14:creationId xmlns:p14="http://schemas.microsoft.com/office/powerpoint/2010/main" val="3528572952"/>
+      </p:ext>
+    </p:extLst>
+  </p:cSld>
+  <p:clrMapOvr>
+    <a:masterClrMapping/>
+  </p:clrMapOvr>
+  <p:timing>
+    <p:tnLst>
+      <p:par>
+        <p:cTn xmlns:p14="http://schemas.microsoft.com/office/powerpoint/2010/main" id="1" dur="indefinite" restart="never" nodeType="tmRoot"/>
+      </p:par>
+    </p:tnLst>
+  </p:timing>
+</p:sld>
+</file>
+
+<file path=ppt/slides/slide24.xml><?xml version="1.0" encoding="utf-8"?>
+<p:sld xmlns:a="http://schemas.openxmlformats.org/drawingml/2006/main" xmlns:r="http://schemas.openxmlformats.org/officeDocument/2006/relationships" xmlns:p="http://schemas.openxmlformats.org/presentationml/2006/main">
+  <p:cSld>
+    <p:spTree>
+      <p:nvGrpSpPr>
+        <p:cNvPr id="1" name=""/>
+        <p:cNvGrpSpPr/>
+        <p:nvPr/>
+      </p:nvGrpSpPr>
+      <p:grpSpPr>
+        <a:xfrm>
+          <a:off x="0" y="0"/>
+          <a:ext cx="0" cy="0"/>
+          <a:chOff x="0" y="0"/>
+          <a:chExt cx="0" cy="0"/>
+        </a:xfrm>
+      </p:grpSpPr>
+      <p:sp>
+        <p:nvSpPr>
+          <p:cNvPr id="2" name="Название 1"/>
+          <p:cNvSpPr>
+            <a:spLocks noGrp="1"/>
+          </p:cNvSpPr>
+          <p:nvPr>
+            <p:ph type="title"/>
+          </p:nvPr>
+        </p:nvSpPr>
+        <p:spPr/>
+        <p:txBody>
+          <a:bodyPr>
+            <a:normAutofit fontScale="90000"/>
+          </a:bodyPr>
+          <a:lstStyle/>
+          <a:p>
+            <a:r>
+              <a:rPr lang="ru-RU" dirty="0" smtClean="0"/>
+              <a:t>Алгоритм </a:t>
+            </a:r>
+            <a:r>
+              <a:rPr lang="ru-RU" dirty="0" err="1" smtClean="0"/>
+              <a:t>базований</a:t>
+            </a:r>
+            <a:r>
+              <a:rPr lang="ru-RU" dirty="0" smtClean="0"/>
+              <a:t> на </a:t>
+            </a:r>
+            <a:r>
+              <a:rPr lang="ru-RU" dirty="0" err="1" smtClean="0"/>
+              <a:t>позитивних</a:t>
+            </a:r>
+            <a:r>
+              <a:rPr lang="ru-RU" dirty="0" smtClean="0"/>
+              <a:t> і </a:t>
+            </a:r>
+            <a:r>
+              <a:rPr lang="ru-RU" dirty="0" err="1" smtClean="0"/>
+              <a:t>негативних</a:t>
+            </a:r>
+            <a:r>
+              <a:rPr lang="ru-RU" dirty="0" smtClean="0"/>
+              <a:t> словах</a:t>
+            </a:r>
+            <a:endParaRPr lang="ru-RU" dirty="0"/>
+          </a:p>
+        </p:txBody>
+      </p:sp>
+      <p:sp>
+        <p:nvSpPr>
+          <p:cNvPr id="3" name="Содержимое 2"/>
+          <p:cNvSpPr>
+            <a:spLocks noGrp="1"/>
+          </p:cNvSpPr>
+          <p:nvPr>
+            <p:ph idx="1"/>
+          </p:nvPr>
+        </p:nvSpPr>
+        <p:spPr/>
+        <p:txBody>
+          <a:bodyPr/>
+          <a:lstStyle/>
+          <a:p>
+            <a:r>
+              <a:rPr lang="uk-UA" dirty="0" smtClean="0"/>
+              <a:t>Словник позитивного і негативного лексикону в англійській мові (приблизно 6800 слів)</a:t>
+            </a:r>
+          </a:p>
+          <a:p>
+            <a:r>
+              <a:rPr lang="en-US" dirty="0"/>
+              <a:t>https://</a:t>
+            </a:r>
+            <a:r>
+              <a:rPr lang="en-US" dirty="0" err="1"/>
+              <a:t>www.cs.uic.edu</a:t>
+            </a:r>
+            <a:r>
+              <a:rPr lang="en-US" dirty="0"/>
+              <a:t>/~</a:t>
+            </a:r>
+            <a:r>
+              <a:rPr lang="en-US" dirty="0" err="1"/>
+              <a:t>liub</a:t>
+            </a:r>
+            <a:r>
+              <a:rPr lang="en-US" dirty="0"/>
+              <a:t>/FBS/sentiment-</a:t>
+            </a:r>
+            <a:r>
+              <a:rPr lang="en-US" dirty="0" err="1"/>
+              <a:t>analysis.html</a:t>
+            </a:r>
+            <a:endParaRPr lang="uk-UA" dirty="0" smtClean="0"/>
+          </a:p>
+          <a:p>
+            <a:r>
+              <a:rPr lang="en-US" dirty="0" smtClean="0"/>
+              <a:t>prediction </a:t>
+            </a:r>
+            <a:r>
+              <a:rPr lang="en-US" dirty="0"/>
+              <a:t>= 1+round(4∗(</a:t>
+            </a:r>
+            <a:r>
+              <a:rPr lang="en-US" dirty="0" err="1"/>
+              <a:t>positivecount</a:t>
+            </a:r>
+            <a:r>
+              <a:rPr lang="en-US" dirty="0"/>
+              <a:t>/(</a:t>
+            </a:r>
+            <a:r>
+              <a:rPr lang="en-US" dirty="0" err="1"/>
+              <a:t>positivecount</a:t>
+            </a:r>
+            <a:r>
+              <a:rPr lang="en-US" dirty="0"/>
+              <a:t>+ </a:t>
+            </a:r>
+            <a:r>
+              <a:rPr lang="en-US" dirty="0" err="1"/>
+              <a:t>negativecount</a:t>
+            </a:r>
+            <a:r>
+              <a:rPr lang="en-US" dirty="0"/>
+              <a:t>)) </a:t>
+            </a:r>
+            <a:endParaRPr lang="en-US" dirty="0"/>
+          </a:p>
+          <a:p>
+            <a:endParaRPr lang="ru-RU" dirty="0"/>
+          </a:p>
+        </p:txBody>
+      </p:sp>
+    </p:spTree>
+    <p:extLst>
+      <p:ext uri="{BB962C8B-B14F-4D97-AF65-F5344CB8AC3E}">
+        <p14:creationId xmlns:p14="http://schemas.microsoft.com/office/powerpoint/2010/main" val="1146641273"/>
+      </p:ext>
+    </p:extLst>
+  </p:cSld>
+  <p:clrMapOvr>
+    <a:masterClrMapping/>
+  </p:clrMapOvr>
+  <p:timing>
+    <p:tnLst>
+      <p:par>
+        <p:cTn xmlns:p14="http://schemas.microsoft.com/office/powerpoint/2010/main" id="1" dur="indefinite" restart="never" nodeType="tmRoot"/>
+      </p:par>
+    </p:tnLst>
+  </p:timing>
+</p:sld>
+</file>
+
+<file path=ppt/slides/slide25.xml><?xml version="1.0" encoding="utf-8"?>
+<p:sld xmlns:a="http://schemas.openxmlformats.org/drawingml/2006/main" xmlns:r="http://schemas.openxmlformats.org/officeDocument/2006/relationships" xmlns:p="http://schemas.openxmlformats.org/presentationml/2006/main">
+  <p:cSld>
+    <p:spTree>
+      <p:nvGrpSpPr>
+        <p:cNvPr id="1" name=""/>
+        <p:cNvGrpSpPr/>
+        <p:nvPr/>
+      </p:nvGrpSpPr>
+      <p:grpSpPr>
+        <a:xfrm>
+          <a:off x="0" y="0"/>
+          <a:ext cx="0" cy="0"/>
+          <a:chOff x="0" y="0"/>
+          <a:chExt cx="0" cy="0"/>
+        </a:xfrm>
+      </p:grpSpPr>
+      <p:sp>
+        <p:nvSpPr>
+          <p:cNvPr id="2" name="Название 1"/>
+          <p:cNvSpPr>
+            <a:spLocks noGrp="1"/>
+          </p:cNvSpPr>
+          <p:nvPr>
+            <p:ph type="title"/>
+          </p:nvPr>
+        </p:nvSpPr>
+        <p:spPr/>
+        <p:txBody>
+          <a:bodyPr>
+            <a:normAutofit fontScale="90000"/>
+          </a:bodyPr>
+          <a:lstStyle/>
+          <a:p>
+            <a:r>
+              <a:rPr lang="ru-RU" dirty="0"/>
+              <a:t>Алгоритм </a:t>
+            </a:r>
+            <a:r>
+              <a:rPr lang="ru-RU" dirty="0" err="1"/>
+              <a:t>базований</a:t>
+            </a:r>
+            <a:r>
+              <a:rPr lang="ru-RU" dirty="0"/>
+              <a:t> на </a:t>
+            </a:r>
+            <a:r>
+              <a:rPr lang="ru-RU" dirty="0" err="1"/>
+              <a:t>позитивних</a:t>
+            </a:r>
+            <a:r>
+              <a:rPr lang="ru-RU" dirty="0"/>
+              <a:t> і </a:t>
+            </a:r>
+            <a:r>
+              <a:rPr lang="ru-RU" dirty="0" err="1"/>
+              <a:t>негативних</a:t>
+            </a:r>
+            <a:r>
+              <a:rPr lang="ru-RU" dirty="0"/>
+              <a:t> словах</a:t>
+            </a:r>
+          </a:p>
+        </p:txBody>
+      </p:sp>
+      <p:pic>
+        <p:nvPicPr>
+          <p:cNvPr id="4" name="Изображение 3" descr="Screen Shot 2016-06-06 at 10.35.14 PM.png"/>
+          <p:cNvPicPr>
+            <a:picLocks noChangeAspect="1"/>
+          </p:cNvPicPr>
+          <p:nvPr/>
+        </p:nvPicPr>
+        <p:blipFill>
+          <a:blip r:embed="rId2">
+            <a:extLst>
+              <a:ext uri="{28A0092B-C50C-407E-A947-70E740481C1C}">
+                <a14:useLocalDpi xmlns:a14="http://schemas.microsoft.com/office/drawing/2010/main" val="0"/>
+              </a:ext>
+            </a:extLst>
+          </a:blip>
+          <a:stretch>
+            <a:fillRect/>
+          </a:stretch>
+        </p:blipFill>
+        <p:spPr>
+          <a:xfrm>
+            <a:off x="457200" y="1600200"/>
+            <a:ext cx="6337300" cy="2237383"/>
+          </a:xfrm>
+          <a:prstGeom prst="rect">
+            <a:avLst/>
+          </a:prstGeom>
+        </p:spPr>
+      </p:pic>
+      <p:pic>
+        <p:nvPicPr>
+          <p:cNvPr id="5" name="Изображение 4" descr="Screen Shot 2016-06-06 at 10.35.58 PM.png"/>
+          <p:cNvPicPr>
+            <a:picLocks noChangeAspect="1"/>
+          </p:cNvPicPr>
+          <p:nvPr/>
+        </p:nvPicPr>
+        <p:blipFill>
+          <a:blip r:embed="rId3">
+            <a:extLst>
+              <a:ext uri="{28A0092B-C50C-407E-A947-70E740481C1C}">
+                <a14:useLocalDpi xmlns:a14="http://schemas.microsoft.com/office/drawing/2010/main" val="0"/>
+              </a:ext>
+            </a:extLst>
+          </a:blip>
+          <a:stretch>
+            <a:fillRect/>
+          </a:stretch>
+        </p:blipFill>
+        <p:spPr>
+          <a:xfrm>
+            <a:off x="457200" y="3841147"/>
+            <a:ext cx="2505075" cy="451151"/>
+          </a:xfrm>
+          <a:prstGeom prst="rect">
+            <a:avLst/>
+          </a:prstGeom>
+        </p:spPr>
+      </p:pic>
+      <p:pic>
+        <p:nvPicPr>
+          <p:cNvPr id="6" name="Изображение 5" descr="Screen Shot 2016-06-06 at 10.36.16 PM.png"/>
+          <p:cNvPicPr>
+            <a:picLocks noChangeAspect="1"/>
+          </p:cNvPicPr>
+          <p:nvPr/>
+        </p:nvPicPr>
+        <p:blipFill>
+          <a:blip r:embed="rId4">
+            <a:extLst>
+              <a:ext uri="{28A0092B-C50C-407E-A947-70E740481C1C}">
+                <a14:useLocalDpi xmlns:a14="http://schemas.microsoft.com/office/drawing/2010/main" val="0"/>
+              </a:ext>
+            </a:extLst>
+          </a:blip>
+          <a:stretch>
+            <a:fillRect/>
+          </a:stretch>
+        </p:blipFill>
+        <p:spPr>
+          <a:xfrm>
+            <a:off x="2111375" y="4292298"/>
+            <a:ext cx="5445125" cy="2490494"/>
+          </a:xfrm>
+          <a:prstGeom prst="rect">
+            <a:avLst/>
+          </a:prstGeom>
+        </p:spPr>
+      </p:pic>
+    </p:spTree>
+    <p:extLst>
+      <p:ext uri="{BB962C8B-B14F-4D97-AF65-F5344CB8AC3E}">
+        <p14:creationId xmlns:p14="http://schemas.microsoft.com/office/powerpoint/2010/main" val="187866993"/>
+      </p:ext>
+    </p:extLst>
+  </p:cSld>
+  <p:clrMapOvr>
+    <a:masterClrMapping/>
+  </p:clrMapOvr>
+  <p:timing>
+    <p:tnLst>
+      <p:par>
+        <p:cTn xmlns:p14="http://schemas.microsoft.com/office/powerpoint/2010/main" id="1" dur="indefinite" restart="never" nodeType="tmRoot"/>
+      </p:par>
+    </p:tnLst>
+  </p:timing>
+</p:sld>
+</file>
+
+<file path=ppt/slides/slide26.xml><?xml version="1.0" encoding="utf-8"?>
+<p:sld xmlns:a="http://schemas.openxmlformats.org/drawingml/2006/main" xmlns:r="http://schemas.openxmlformats.org/officeDocument/2006/relationships" xmlns:p="http://schemas.openxmlformats.org/presentationml/2006/main">
+  <p:cSld>
+    <p:spTree>
+      <p:nvGrpSpPr>
+        <p:cNvPr id="1" name=""/>
+        <p:cNvGrpSpPr/>
+        <p:nvPr/>
+      </p:nvGrpSpPr>
+      <p:grpSpPr>
+        <a:xfrm>
+          <a:off x="0" y="0"/>
+          <a:ext cx="0" cy="0"/>
+          <a:chOff x="0" y="0"/>
+          <a:chExt cx="0" cy="0"/>
+        </a:xfrm>
+      </p:grpSpPr>
+      <p:sp>
+        <p:nvSpPr>
+          <p:cNvPr id="2" name="Название 1"/>
+          <p:cNvSpPr>
+            <a:spLocks noGrp="1"/>
+          </p:cNvSpPr>
+          <p:nvPr>
+            <p:ph type="title"/>
+          </p:nvPr>
+        </p:nvSpPr>
+        <p:spPr/>
+        <p:txBody>
+          <a:bodyPr>
+            <a:normAutofit fontScale="90000"/>
+          </a:bodyPr>
+          <a:lstStyle/>
+          <a:p>
+            <a:r>
+              <a:rPr lang="ru-RU" dirty="0" err="1" smtClean="0"/>
+              <a:t>Тренування</a:t>
+            </a:r>
+            <a:r>
+              <a:rPr lang="ru-RU" dirty="0" smtClean="0"/>
+              <a:t> на словах </a:t>
+            </a:r>
+            <a:r>
+              <a:rPr lang="ru-RU" dirty="0" err="1" smtClean="0"/>
+              <a:t>оптимальних</a:t>
+            </a:r>
+            <a:r>
+              <a:rPr lang="ru-RU" dirty="0" smtClean="0"/>
+              <a:t> для </a:t>
+            </a:r>
+            <a:r>
+              <a:rPr lang="ru-RU" dirty="0" err="1" smtClean="0"/>
+              <a:t>бінарної</a:t>
+            </a:r>
+            <a:r>
+              <a:rPr lang="ru-RU" dirty="0" smtClean="0"/>
+              <a:t> </a:t>
+            </a:r>
+            <a:r>
+              <a:rPr lang="ru-RU" dirty="0" err="1" smtClean="0"/>
+              <a:t>класифікації</a:t>
+            </a:r>
+            <a:endParaRPr lang="ru-RU" dirty="0"/>
+          </a:p>
+        </p:txBody>
+      </p:sp>
+      <p:pic>
+        <p:nvPicPr>
+          <p:cNvPr id="4" name="Содержимое 3" descr="Screen Shot 2016-06-06 at 11.15.57 PM.png"/>
+          <p:cNvPicPr>
+            <a:picLocks noGrp="1" noChangeAspect="1"/>
+          </p:cNvPicPr>
+          <p:nvPr>
+            <p:ph idx="1"/>
+          </p:nvPr>
+        </p:nvPicPr>
+        <p:blipFill>
+          <a:blip r:embed="rId2">
+            <a:extLst>
+              <a:ext uri="{28A0092B-C50C-407E-A947-70E740481C1C}">
+                <a14:useLocalDpi xmlns:a14="http://schemas.microsoft.com/office/drawing/2010/main" val="0"/>
+              </a:ext>
+            </a:extLst>
+          </a:blip>
+          <a:srcRect l="-13566" r="-13566"/>
+          <a:stretch>
+            <a:fillRect/>
+          </a:stretch>
+        </p:blipFill>
+        <p:spPr/>
+      </p:pic>
+    </p:spTree>
+    <p:extLst>
+      <p:ext uri="{BB962C8B-B14F-4D97-AF65-F5344CB8AC3E}">
+        <p14:creationId xmlns:p14="http://schemas.microsoft.com/office/powerpoint/2010/main" val="452034336"/>
+      </p:ext>
+    </p:extLst>
+  </p:cSld>
+  <p:clrMapOvr>
+    <a:masterClrMapping/>
+  </p:clrMapOvr>
+  <p:timing>
+    <p:tnLst>
+      <p:par>
+        <p:cTn xmlns:p14="http://schemas.microsoft.com/office/powerpoint/2010/main" id="1" dur="indefinite" restart="never" nodeType="tmRoot"/>
+      </p:par>
+    </p:tnLst>
+  </p:timing>
+</p:sld>
+</file>
+
+<file path=ppt/slides/slide27.xml><?xml version="1.0" encoding="utf-8"?>
+<p:sld xmlns:a="http://schemas.openxmlformats.org/drawingml/2006/main" xmlns:r="http://schemas.openxmlformats.org/officeDocument/2006/relationships" xmlns:p="http://schemas.openxmlformats.org/presentationml/2006/main">
+  <p:cSld>
+    <p:spTree>
+      <p:nvGrpSpPr>
+        <p:cNvPr id="1" name=""/>
+        <p:cNvGrpSpPr/>
+        <p:nvPr/>
+      </p:nvGrpSpPr>
+      <p:grpSpPr>
+        <a:xfrm>
+          <a:off x="0" y="0"/>
+          <a:ext cx="0" cy="0"/>
+          <a:chOff x="0" y="0"/>
+          <a:chExt cx="0" cy="0"/>
+        </a:xfrm>
+      </p:grpSpPr>
+      <p:sp>
+        <p:nvSpPr>
+          <p:cNvPr id="2" name="Название 1"/>
+          <p:cNvSpPr>
+            <a:spLocks noGrp="1"/>
+          </p:cNvSpPr>
+          <p:nvPr>
+            <p:ph type="title"/>
+          </p:nvPr>
+        </p:nvSpPr>
+        <p:spPr/>
+        <p:txBody>
+          <a:bodyPr/>
+          <a:lstStyle/>
+          <a:p>
+            <a:r>
+              <a:rPr lang="ru-RU" dirty="0" err="1" smtClean="0"/>
+              <a:t>Наукова</a:t>
+            </a:r>
+            <a:r>
+              <a:rPr lang="ru-RU" dirty="0" smtClean="0"/>
+              <a:t> новизна</a:t>
+            </a:r>
+            <a:endParaRPr lang="ru-RU" dirty="0"/>
+          </a:p>
+        </p:txBody>
+      </p:sp>
+      <p:sp>
+        <p:nvSpPr>
+          <p:cNvPr id="3" name="Содержимое 2"/>
+          <p:cNvSpPr>
+            <a:spLocks noGrp="1"/>
+          </p:cNvSpPr>
+          <p:nvPr>
+            <p:ph idx="1"/>
+          </p:nvPr>
+        </p:nvSpPr>
+        <p:spPr/>
+        <p:txBody>
+          <a:bodyPr/>
+          <a:lstStyle/>
+          <a:p>
+            <a:r>
+              <a:rPr lang="ru-RU" dirty="0" err="1" smtClean="0"/>
+              <a:t>Розглянуто</a:t>
+            </a:r>
+            <a:r>
+              <a:rPr lang="ru-RU" dirty="0" smtClean="0"/>
+              <a:t> </a:t>
+            </a:r>
+            <a:r>
+              <a:rPr lang="ru-RU" dirty="0" err="1" smtClean="0"/>
+              <a:t>менш</a:t>
+            </a:r>
+            <a:r>
+              <a:rPr lang="ru-RU" dirty="0" smtClean="0"/>
+              <a:t> </a:t>
+            </a:r>
+            <a:r>
+              <a:rPr lang="ru-RU" dirty="0" err="1" smtClean="0"/>
+              <a:t>поширену</a:t>
+            </a:r>
+            <a:r>
+              <a:rPr lang="ru-RU" dirty="0" smtClean="0"/>
+              <a:t> проблему </a:t>
+            </a:r>
+            <a:r>
+              <a:rPr lang="ru-RU" dirty="0" err="1" smtClean="0"/>
+              <a:t>більш</a:t>
+            </a:r>
+            <a:r>
+              <a:rPr lang="ru-RU" dirty="0" smtClean="0"/>
+              <a:t> </a:t>
+            </a:r>
+            <a:r>
+              <a:rPr lang="ru-RU" dirty="0" err="1" smtClean="0"/>
+              <a:t>детальної</a:t>
+            </a:r>
+            <a:r>
+              <a:rPr lang="ru-RU" dirty="0" smtClean="0"/>
+              <a:t> </a:t>
+            </a:r>
+            <a:r>
+              <a:rPr lang="ru-RU" dirty="0" err="1" smtClean="0"/>
+              <a:t>класифікації</a:t>
+            </a:r>
+            <a:r>
+              <a:rPr lang="ru-RU" dirty="0" smtClean="0"/>
+              <a:t> </a:t>
+            </a:r>
+            <a:r>
+              <a:rPr lang="ru-RU" dirty="0" err="1" smtClean="0"/>
+              <a:t>сентиментів</a:t>
+            </a:r>
+            <a:endParaRPr lang="ru-RU" dirty="0" smtClean="0"/>
+          </a:p>
+          <a:p>
+            <a:r>
+              <a:rPr lang="ru-RU" dirty="0" err="1" smtClean="0"/>
+              <a:t>Виконано</a:t>
+            </a:r>
+            <a:r>
+              <a:rPr lang="ru-RU" dirty="0" smtClean="0"/>
+              <a:t> </a:t>
+            </a:r>
+            <a:r>
+              <a:rPr lang="ru-RU" dirty="0" err="1" smtClean="0"/>
+              <a:t>порівняння</a:t>
+            </a:r>
+            <a:r>
+              <a:rPr lang="ru-RU" dirty="0" smtClean="0"/>
+              <a:t> з </a:t>
+            </a:r>
+            <a:r>
+              <a:rPr lang="ru-RU" dirty="0" err="1" smtClean="0"/>
+              <a:t>існуючими</a:t>
+            </a:r>
+            <a:r>
+              <a:rPr lang="ru-RU" dirty="0" smtClean="0"/>
+              <a:t> методами і </a:t>
+            </a:r>
+            <a:r>
+              <a:rPr lang="ru-RU" dirty="0" err="1" smtClean="0"/>
+              <a:t>розроблено</a:t>
+            </a:r>
+            <a:r>
+              <a:rPr lang="ru-RU" dirty="0" smtClean="0"/>
+              <a:t> </a:t>
+            </a:r>
+            <a:r>
+              <a:rPr lang="ru-RU" dirty="0" err="1" smtClean="0"/>
+              <a:t>модифікацію</a:t>
+            </a:r>
+            <a:r>
+              <a:rPr lang="ru-RU" dirty="0" smtClean="0"/>
+              <a:t>, яка </a:t>
+            </a:r>
+            <a:r>
+              <a:rPr lang="ru-RU" dirty="0" err="1" smtClean="0"/>
+              <a:t>покращує</a:t>
+            </a:r>
+            <a:r>
+              <a:rPr lang="ru-RU" dirty="0" smtClean="0"/>
+              <a:t> результат</a:t>
+            </a:r>
+            <a:endParaRPr lang="ru-RU" dirty="0"/>
+          </a:p>
+        </p:txBody>
+      </p:sp>
+    </p:spTree>
+    <p:extLst>
+      <p:ext uri="{BB962C8B-B14F-4D97-AF65-F5344CB8AC3E}">
+        <p14:creationId xmlns:p14="http://schemas.microsoft.com/office/powerpoint/2010/main" val="326433767"/>
+      </p:ext>
+    </p:extLst>
+  </p:cSld>
+  <p:clrMapOvr>
+    <a:masterClrMapping/>
+  </p:clrMapOvr>
+  <p:timing>
+    <p:tnLst>
+      <p:par>
+        <p:cTn xmlns:p14="http://schemas.microsoft.com/office/powerpoint/2010/main" id="1" dur="indefinite" restart="never" nodeType="tmRoot"/>
+      </p:par>
+    </p:tnLst>
+  </p:timing>
+</p:sld>
+</file>
+
+<file path=ppt/slides/slide28.xml><?xml version="1.0" encoding="utf-8"?>
+<p:sld xmlns:a="http://schemas.openxmlformats.org/drawingml/2006/main" xmlns:r="http://schemas.openxmlformats.org/officeDocument/2006/relationships" xmlns:p="http://schemas.openxmlformats.org/presentationml/2006/main">
+  <p:cSld>
+    <p:spTree>
+      <p:nvGrpSpPr>
+        <p:cNvPr id="1" name=""/>
+        <p:cNvGrpSpPr/>
+        <p:nvPr/>
+      </p:nvGrpSpPr>
+      <p:grpSpPr>
+        <a:xfrm>
+          <a:off x="0" y="0"/>
+          <a:ext cx="0" cy="0"/>
+          <a:chOff x="0" y="0"/>
+          <a:chExt cx="0" cy="0"/>
+        </a:xfrm>
+      </p:grpSpPr>
+      <p:sp>
+        <p:nvSpPr>
+          <p:cNvPr id="2" name="Название 1"/>
+          <p:cNvSpPr>
+            <a:spLocks noGrp="1"/>
+          </p:cNvSpPr>
+          <p:nvPr>
+            <p:ph type="title"/>
+          </p:nvPr>
+        </p:nvSpPr>
+        <p:spPr/>
+        <p:txBody>
+          <a:bodyPr>
+            <a:normAutofit fontScale="90000"/>
+          </a:bodyPr>
+          <a:lstStyle/>
+          <a:p>
+            <a:r>
+              <a:rPr lang="ru-RU" dirty="0" smtClean="0"/>
+              <a:t>Практична </a:t>
+            </a:r>
+            <a:r>
+              <a:rPr lang="ru-RU" dirty="0" err="1" smtClean="0"/>
+              <a:t>значимість</a:t>
+            </a:r>
+            <a:r>
+              <a:rPr lang="ru-RU" dirty="0" smtClean="0"/>
+              <a:t> </a:t>
+            </a:r>
+            <a:r>
+              <a:rPr lang="ru-RU" dirty="0" err="1" smtClean="0"/>
+              <a:t>результатів</a:t>
+            </a:r>
+            <a:endParaRPr lang="ru-RU" dirty="0"/>
+          </a:p>
+        </p:txBody>
+      </p:sp>
+      <p:sp>
+        <p:nvSpPr>
+          <p:cNvPr id="3" name="Содержимое 2"/>
+          <p:cNvSpPr>
+            <a:spLocks noGrp="1"/>
+          </p:cNvSpPr>
+          <p:nvPr>
+            <p:ph idx="1"/>
+          </p:nvPr>
+        </p:nvSpPr>
+        <p:spPr/>
+        <p:txBody>
+          <a:bodyPr/>
+          <a:lstStyle/>
+          <a:p>
+            <a:r>
+              <a:rPr lang="ru-RU" dirty="0" err="1" smtClean="0"/>
+              <a:t>Наочно</a:t>
+            </a:r>
+            <a:r>
+              <a:rPr lang="ru-RU" dirty="0" smtClean="0"/>
+              <a:t> показано, </a:t>
+            </a:r>
+            <a:r>
+              <a:rPr lang="ru-RU" dirty="0" err="1" smtClean="0"/>
+              <a:t>що</a:t>
+            </a:r>
+            <a:r>
+              <a:rPr lang="ru-RU" dirty="0" smtClean="0"/>
+              <a:t> </a:t>
+            </a:r>
+            <a:r>
+              <a:rPr lang="ru-RU" dirty="0" err="1" smtClean="0"/>
+              <a:t>алгоритми</a:t>
+            </a:r>
+            <a:r>
+              <a:rPr lang="ru-RU" dirty="0" smtClean="0"/>
+              <a:t> </a:t>
+            </a:r>
+            <a:r>
+              <a:rPr lang="ru-RU" dirty="0" err="1" smtClean="0"/>
+              <a:t>розроблені</a:t>
+            </a:r>
+            <a:r>
+              <a:rPr lang="ru-RU" dirty="0" smtClean="0"/>
+              <a:t> для </a:t>
+            </a:r>
+            <a:r>
+              <a:rPr lang="ru-RU" dirty="0" err="1" smtClean="0"/>
+              <a:t>бінарної</a:t>
+            </a:r>
+            <a:r>
+              <a:rPr lang="ru-RU" dirty="0" smtClean="0"/>
+              <a:t> </a:t>
+            </a:r>
+            <a:r>
+              <a:rPr lang="ru-RU" dirty="0" err="1" smtClean="0"/>
+              <a:t>класифікації</a:t>
+            </a:r>
+            <a:r>
+              <a:rPr lang="ru-RU" dirty="0" smtClean="0"/>
+              <a:t>, погано </a:t>
+            </a:r>
+            <a:r>
+              <a:rPr lang="ru-RU" dirty="0" err="1" smtClean="0"/>
+              <a:t>підходять</a:t>
+            </a:r>
+            <a:r>
+              <a:rPr lang="ru-RU" dirty="0" smtClean="0"/>
+              <a:t> для </a:t>
+            </a:r>
+            <a:r>
+              <a:rPr lang="ru-RU" dirty="0" err="1" smtClean="0"/>
+              <a:t>більш</a:t>
+            </a:r>
+            <a:r>
+              <a:rPr lang="ru-RU" dirty="0" smtClean="0"/>
+              <a:t> детального </a:t>
+            </a:r>
+            <a:r>
+              <a:rPr lang="ru-RU" dirty="0" err="1" smtClean="0"/>
+              <a:t>аналізу</a:t>
+            </a:r>
+            <a:r>
+              <a:rPr lang="ru-RU" dirty="0" smtClean="0"/>
+              <a:t> </a:t>
+            </a:r>
+            <a:r>
+              <a:rPr lang="ru-RU" dirty="0" err="1" smtClean="0"/>
+              <a:t>сентиментів</a:t>
+            </a:r>
+            <a:endParaRPr lang="ru-RU" dirty="0" smtClean="0"/>
+          </a:p>
+          <a:p>
+            <a:r>
+              <a:rPr lang="ru-RU" dirty="0" err="1" smtClean="0"/>
+              <a:t>Алгоритми</a:t>
+            </a:r>
+            <a:r>
+              <a:rPr lang="ru-RU" dirty="0" smtClean="0"/>
+              <a:t> </a:t>
+            </a:r>
+            <a:r>
+              <a:rPr lang="ru-RU" dirty="0" err="1" smtClean="0"/>
+              <a:t>базовані</a:t>
+            </a:r>
+            <a:r>
+              <a:rPr lang="ru-RU" dirty="0" smtClean="0"/>
+              <a:t> на </a:t>
+            </a:r>
+            <a:r>
+              <a:rPr lang="ru-RU" dirty="0" err="1" smtClean="0"/>
+              <a:t>статистиці</a:t>
+            </a:r>
+            <a:r>
+              <a:rPr lang="ru-RU" dirty="0" smtClean="0"/>
+              <a:t> </a:t>
+            </a:r>
+            <a:r>
+              <a:rPr lang="ru-RU" dirty="0" err="1" smtClean="0"/>
+              <a:t>можуть</a:t>
+            </a:r>
+            <a:r>
+              <a:rPr lang="ru-RU" dirty="0" smtClean="0"/>
+              <a:t> </a:t>
+            </a:r>
+            <a:r>
+              <a:rPr lang="ru-RU" dirty="0" err="1" smtClean="0"/>
+              <a:t>конкурувати</a:t>
+            </a:r>
+            <a:r>
+              <a:rPr lang="ru-RU" dirty="0" smtClean="0"/>
+              <a:t> з алгоритмами </a:t>
+            </a:r>
+            <a:r>
+              <a:rPr lang="ru-RU" dirty="0" err="1" smtClean="0"/>
+              <a:t>основаними</a:t>
+            </a:r>
+            <a:r>
+              <a:rPr lang="ru-RU" dirty="0" smtClean="0"/>
+              <a:t> на </a:t>
+            </a:r>
+            <a:r>
+              <a:rPr lang="ru-RU" dirty="0" err="1" smtClean="0"/>
+              <a:t>предметній</a:t>
+            </a:r>
+            <a:r>
+              <a:rPr lang="ru-RU" dirty="0" smtClean="0"/>
+              <a:t> </a:t>
+            </a:r>
+            <a:r>
+              <a:rPr lang="ru-RU" dirty="0" err="1" smtClean="0"/>
+              <a:t>області</a:t>
+            </a:r>
+            <a:endParaRPr lang="en-US" dirty="0" smtClean="0"/>
+          </a:p>
+          <a:p>
+            <a:r>
+              <a:rPr lang="uk-UA" dirty="0" smtClean="0"/>
+              <a:t>Підібрано оптимальні параметри для найефективнішого застосування алгоритму</a:t>
+            </a:r>
+            <a:endParaRPr lang="ru-RU" dirty="0"/>
+          </a:p>
+        </p:txBody>
+      </p:sp>
+    </p:spTree>
+    <p:extLst>
+      <p:ext uri="{BB962C8B-B14F-4D97-AF65-F5344CB8AC3E}">
+        <p14:creationId xmlns:p14="http://schemas.microsoft.com/office/powerpoint/2010/main" val="2818727489"/>
+      </p:ext>
+    </p:extLst>
+  </p:cSld>
+  <p:clrMapOvr>
+    <a:masterClrMapping/>
+  </p:clrMapOvr>
+  <p:timing>
+    <p:tnLst>
+      <p:par>
+        <p:cTn xmlns:p14="http://schemas.microsoft.com/office/powerpoint/2010/main" id="1" dur="indefinite" restart="never" nodeType="tmRoot"/>
+      </p:par>
+    </p:tnLst>
+  </p:timing>
+</p:sld>
+</file>
+
+<file path=ppt/slides/slide29.xml><?xml version="1.0" encoding="utf-8"?>
+<p:sld xmlns:a="http://schemas.openxmlformats.org/drawingml/2006/main" xmlns:r="http://schemas.openxmlformats.org/officeDocument/2006/relationships" xmlns:p="http://schemas.openxmlformats.org/presentationml/2006/main">
+  <p:cSld>
+    <p:spTree>
+      <p:nvGrpSpPr>
+        <p:cNvPr id="1" name=""/>
+        <p:cNvGrpSpPr/>
+        <p:nvPr/>
+      </p:nvGrpSpPr>
+      <p:grpSpPr>
+        <a:xfrm>
+          <a:off x="0" y="0"/>
+          <a:ext cx="0" cy="0"/>
+          <a:chOff x="0" y="0"/>
+          <a:chExt cx="0" cy="0"/>
+        </a:xfrm>
+      </p:grpSpPr>
+      <p:sp>
+        <p:nvSpPr>
+          <p:cNvPr id="2" name="Название 1"/>
+          <p:cNvSpPr>
+            <a:spLocks noGrp="1"/>
+          </p:cNvSpPr>
+          <p:nvPr>
+            <p:ph type="title"/>
+          </p:nvPr>
+        </p:nvSpPr>
+        <p:spPr/>
+        <p:txBody>
+          <a:bodyPr/>
+          <a:lstStyle/>
+          <a:p>
+            <a:r>
+              <a:rPr lang="ru-RU" dirty="0" err="1" smtClean="0"/>
+              <a:t>Доповідь</a:t>
+            </a:r>
+            <a:r>
+              <a:rPr lang="ru-RU" dirty="0" smtClean="0"/>
+              <a:t> </a:t>
+            </a:r>
+            <a:r>
+              <a:rPr lang="ru-RU" dirty="0" err="1" smtClean="0"/>
+              <a:t>закінчена</a:t>
+            </a:r>
+            <a:endParaRPr lang="ru-RU" dirty="0"/>
+          </a:p>
+        </p:txBody>
+      </p:sp>
+      <p:sp>
+        <p:nvSpPr>
+          <p:cNvPr id="3" name="Содержимое 2"/>
+          <p:cNvSpPr>
+            <a:spLocks noGrp="1"/>
+          </p:cNvSpPr>
+          <p:nvPr>
+            <p:ph idx="1"/>
+          </p:nvPr>
+        </p:nvSpPr>
+        <p:spPr/>
+        <p:txBody>
+          <a:bodyPr/>
+          <a:lstStyle/>
+          <a:p>
+            <a:r>
+              <a:rPr lang="ru-RU" dirty="0" err="1" smtClean="0"/>
+              <a:t>Дякую</a:t>
+            </a:r>
+            <a:r>
+              <a:rPr lang="ru-RU" dirty="0" smtClean="0"/>
+              <a:t> за </a:t>
+            </a:r>
+            <a:r>
+              <a:rPr lang="ru-RU" dirty="0" err="1" smtClean="0"/>
+              <a:t>увагу</a:t>
+            </a:r>
+            <a:r>
+              <a:rPr lang="ru-RU" dirty="0" smtClean="0"/>
+              <a:t>!</a:t>
+            </a:r>
+            <a:endParaRPr lang="ru-RU" dirty="0"/>
+          </a:p>
+        </p:txBody>
+      </p:sp>
+    </p:spTree>
+    <p:extLst>
+      <p:ext uri="{BB962C8B-B14F-4D97-AF65-F5344CB8AC3E}">
+        <p14:creationId xmlns:p14="http://schemas.microsoft.com/office/powerpoint/2010/main" val="2428671324"/>
       </p:ext>
     </p:extLst>
   </p:cSld>
@@ -4134,11 +6337,11 @@
           <a:p>
             <a:r>
               <a:rPr lang="ru-RU" dirty="0" smtClean="0"/>
-              <a:t>5 </a:t>
-            </a:r>
-            <a:r>
-              <a:rPr lang="ru-RU" dirty="0" err="1" smtClean="0"/>
-              <a:t>лейблів</a:t>
+              <a:t>5-зірковий </a:t>
+            </a:r>
+            <a:r>
+              <a:rPr lang="ru-RU" dirty="0" err="1" smtClean="0"/>
+              <a:t>класифікатор</a:t>
             </a:r>
             <a:endParaRPr lang="ru-RU" dirty="0"/>
           </a:p>
@@ -4218,16 +6421,18 @@
         </p:nvSpPr>
         <p:spPr/>
         <p:txBody>
-          <a:bodyPr/>
-          <a:lstStyle/>
-          <a:p>
-            <a:r>
-              <a:rPr lang="ru-RU" dirty="0" smtClean="0"/>
-              <a:t>Процесс </a:t>
-            </a:r>
-            <a:r>
-              <a:rPr lang="ru-RU" dirty="0" err="1" smtClean="0"/>
-              <a:t>побудови</a:t>
+          <a:bodyPr>
+            <a:normAutofit fontScale="90000"/>
+          </a:bodyPr>
+          <a:lstStyle/>
+          <a:p>
+            <a:r>
+              <a:rPr lang="ru-RU" dirty="0" smtClean="0"/>
+              <a:t>Приклад </a:t>
+            </a:r>
+            <a:r>
+              <a:rPr lang="ru-RU" dirty="0" err="1" smtClean="0"/>
+              <a:t>вхідних</a:t>
             </a:r>
             <a:r>
               <a:rPr lang="ru-RU" dirty="0" smtClean="0"/>
@@ -4235,7 +6440,11 @@
             </a:r>
             <a:r>
               <a:rPr lang="ru-RU" dirty="0" err="1" smtClean="0"/>
-              <a:t>класифікатора</a:t>
+              <a:t>данних</a:t>
+            </a:r>
+            <a:r>
+              <a:rPr lang="en-US" dirty="0" smtClean="0"/>
+              <a:t> (amazon baby products reviews)</a:t>
             </a:r>
             <a:endParaRPr lang="ru-RU" dirty="0"/>
           </a:p>
@@ -4243,7 +6452,7 @@
       </p:sp>
       <p:pic>
         <p:nvPicPr>
-          <p:cNvPr id="4" name="Содержимое 3" descr="Screen Shot 2016-06-05 at 12.11.08 PM.png"/>
+          <p:cNvPr id="4" name="Содержимое 3" descr="Screen Shot 2016-06-06 at 9.53.19 PM.png"/>
           <p:cNvPicPr>
             <a:picLocks noGrp="1" noChangeAspect="1"/>
           </p:cNvPicPr>
@@ -4259,7 +6468,7 @@
               </a:ext>
             </a:extLst>
           </a:blip>
-          <a:srcRect l="-13015" r="-13015"/>
+          <a:srcRect l="-11581" r="-11581"/>
           <a:stretch>
             <a:fillRect/>
           </a:stretch>
@@ -4269,7 +6478,7 @@
     </p:spTree>
     <p:extLst>
       <p:ext uri="{BB962C8B-B14F-4D97-AF65-F5344CB8AC3E}">
-        <p14:creationId xmlns:p14="http://schemas.microsoft.com/office/powerpoint/2010/main" val="2546723954"/>
+        <p14:creationId xmlns:p14="http://schemas.microsoft.com/office/powerpoint/2010/main" val="3396015875"/>
       </p:ext>
     </p:extLst>
   </p:cSld>
@@ -4319,12 +6528,8 @@
           <a:lstStyle/>
           <a:p>
             <a:r>
-              <a:rPr lang="ru-RU" dirty="0" smtClean="0"/>
-              <a:t>Приклад </a:t>
-            </a:r>
-            <a:r>
-              <a:rPr lang="ru-RU" dirty="0" err="1" smtClean="0"/>
-              <a:t>застосування</a:t>
+              <a:rPr lang="uk-UA" dirty="0" smtClean="0"/>
+              <a:t>Критерій якості класифікації</a:t>
             </a:r>
             <a:endParaRPr lang="ru-RU" dirty="0"/>
           </a:p>
@@ -4345,20 +6550,103 @@
           <a:bodyPr/>
           <a:lstStyle/>
           <a:p>
-            <a:endParaRPr lang="ru-RU"/>
-          </a:p>
-        </p:txBody>
-      </p:sp>
+            <a:r>
+              <a:rPr lang="en-US" dirty="0" smtClean="0"/>
+              <a:t>F</a:t>
+            </a:r>
+            <a:r>
+              <a:rPr lang="uk-UA" dirty="0" smtClean="0"/>
+              <a:t>1</a:t>
+            </a:r>
+            <a:r>
+              <a:rPr lang="en-US" dirty="0" smtClean="0"/>
+              <a:t>-score</a:t>
+            </a:r>
+            <a:r>
+              <a:rPr lang="uk-UA" dirty="0" smtClean="0"/>
+              <a:t> (а точніше середнє з усіх класів)</a:t>
+            </a:r>
+            <a:endParaRPr lang="ru-RU" dirty="0"/>
+          </a:p>
+        </p:txBody>
+      </p:sp>
+      <p:pic>
+        <p:nvPicPr>
+          <p:cNvPr id="4" name="Изображение 3" descr="Screen Shot 2016-06-06 at 9.36.40 PM.png"/>
+          <p:cNvPicPr>
+            <a:picLocks noChangeAspect="1"/>
+          </p:cNvPicPr>
+          <p:nvPr/>
+        </p:nvPicPr>
+        <p:blipFill>
+          <a:blip r:embed="rId2">
+            <a:extLst>
+              <a:ext uri="{28A0092B-C50C-407E-A947-70E740481C1C}">
+                <a14:useLocalDpi xmlns:a14="http://schemas.microsoft.com/office/drawing/2010/main" val="0"/>
+              </a:ext>
+            </a:extLst>
+          </a:blip>
+          <a:stretch>
+            <a:fillRect/>
+          </a:stretch>
+        </p:blipFill>
+        <p:spPr>
+          <a:xfrm>
+            <a:off x="2778125" y="2251075"/>
+            <a:ext cx="3594100" cy="850900"/>
+          </a:xfrm>
+          <a:prstGeom prst="rect">
+            <a:avLst/>
+          </a:prstGeom>
+        </p:spPr>
+      </p:pic>
+      <p:pic>
+        <p:nvPicPr>
+          <p:cNvPr id="5" name="Изображение 4" descr="precision_and_recall_graphic.png"/>
+          <p:cNvPicPr>
+            <a:picLocks noChangeAspect="1"/>
+          </p:cNvPicPr>
+          <p:nvPr/>
+        </p:nvPicPr>
+        <p:blipFill>
+          <a:blip r:embed="rId3">
+            <a:extLst>
+              <a:ext uri="{28A0092B-C50C-407E-A947-70E740481C1C}">
+                <a14:useLocalDpi xmlns:a14="http://schemas.microsoft.com/office/drawing/2010/main" val="0"/>
+              </a:ext>
+            </a:extLst>
+          </a:blip>
+          <a:stretch>
+            <a:fillRect/>
+          </a:stretch>
+        </p:blipFill>
+        <p:spPr>
+          <a:xfrm>
+            <a:off x="2778125" y="3190875"/>
+            <a:ext cx="3952875" cy="3429000"/>
+          </a:xfrm>
+          <a:prstGeom prst="rect">
+            <a:avLst/>
+          </a:prstGeom>
+        </p:spPr>
+      </p:pic>
     </p:spTree>
     <p:extLst>
       <p:ext uri="{BB962C8B-B14F-4D97-AF65-F5344CB8AC3E}">
-        <p14:creationId xmlns:p14="http://schemas.microsoft.com/office/powerpoint/2010/main" val="3396015875"/>
+        <p14:creationId xmlns:p14="http://schemas.microsoft.com/office/powerpoint/2010/main" val="2595604081"/>
       </p:ext>
     </p:extLst>
   </p:cSld>
   <p:clrMapOvr>
     <a:masterClrMapping/>
   </p:clrMapOvr>
+  <p:timing>
+    <p:tnLst>
+      <p:par>
+        <p:cTn xmlns:p14="http://schemas.microsoft.com/office/powerpoint/2010/main" id="1" dur="indefinite" restart="never" nodeType="tmRoot"/>
+      </p:par>
+    </p:tnLst>
+  </p:timing>
 </p:sld>
 </file>
 
@@ -4395,8 +6683,12 @@
           <a:lstStyle/>
           <a:p>
             <a:r>
-              <a:rPr lang="ru-RU" dirty="0" err="1" smtClean="0"/>
-              <a:t>Порівняння</a:t>
+              <a:rPr lang="ru-RU" dirty="0" smtClean="0"/>
+              <a:t>Процесс </a:t>
+            </a:r>
+            <a:r>
+              <a:rPr lang="ru-RU" dirty="0" err="1" smtClean="0"/>
+              <a:t>побудови</a:t>
             </a:r>
             <a:r>
               <a:rPr lang="ru-RU" dirty="0" smtClean="0"/>
@@ -4404,41 +6696,54 @@
             </a:r>
             <a:r>
               <a:rPr lang="ru-RU" dirty="0" err="1" smtClean="0"/>
-              <a:t>результатів</a:t>
+              <a:t>класифікатора</a:t>
             </a:r>
             <a:endParaRPr lang="ru-RU" dirty="0"/>
           </a:p>
         </p:txBody>
       </p:sp>
-      <p:sp>
-        <p:nvSpPr>
-          <p:cNvPr id="3" name="Содержимое 2"/>
-          <p:cNvSpPr>
-            <a:spLocks noGrp="1"/>
-          </p:cNvSpPr>
+      <p:pic>
+        <p:nvPicPr>
+          <p:cNvPr id="4" name="Содержимое 3" descr="Screen Shot 2016-06-05 at 12.11.08 PM.png"/>
+          <p:cNvPicPr>
+            <a:picLocks noGrp="1" noChangeAspect="1"/>
+          </p:cNvPicPr>
           <p:nvPr>
             <p:ph idx="1"/>
           </p:nvPr>
-        </p:nvSpPr>
-        <p:spPr/>
-        <p:txBody>
-          <a:bodyPr/>
-          <a:lstStyle/>
-          <a:p>
-            <a:endParaRPr lang="ru-RU"/>
-          </a:p>
-        </p:txBody>
-      </p:sp>
+        </p:nvPicPr>
+        <p:blipFill>
+          <a:blip r:embed="rId2">
+            <a:extLst>
+              <a:ext uri="{28A0092B-C50C-407E-A947-70E740481C1C}">
+                <a14:useLocalDpi xmlns:a14="http://schemas.microsoft.com/office/drawing/2010/main" val="0"/>
+              </a:ext>
+            </a:extLst>
+          </a:blip>
+          <a:srcRect l="-13015" r="-13015"/>
+          <a:stretch>
+            <a:fillRect/>
+          </a:stretch>
+        </p:blipFill>
+        <p:spPr/>
+      </p:pic>
     </p:spTree>
     <p:extLst>
       <p:ext uri="{BB962C8B-B14F-4D97-AF65-F5344CB8AC3E}">
-        <p14:creationId xmlns:p14="http://schemas.microsoft.com/office/powerpoint/2010/main" val="2568683319"/>
+        <p14:creationId xmlns:p14="http://schemas.microsoft.com/office/powerpoint/2010/main" val="2546723954"/>
       </p:ext>
     </p:extLst>
   </p:cSld>
   <p:clrMapOvr>
     <a:masterClrMapping/>
   </p:clrMapOvr>
+  <p:timing>
+    <p:tnLst>
+      <p:par>
+        <p:cTn xmlns:p14="http://schemas.microsoft.com/office/powerpoint/2010/main" id="1" dur="indefinite" restart="never" nodeType="tmRoot"/>
+      </p:par>
+    </p:tnLst>
+  </p:timing>
 </p:sld>
 </file>
 
@@ -4475,12 +6780,8 @@
           <a:lstStyle/>
           <a:p>
             <a:r>
-              <a:rPr lang="ru-RU" dirty="0" err="1" smtClean="0"/>
-              <a:t>Наукова</a:t>
-            </a:r>
-            <a:r>
-              <a:rPr lang="ru-RU" dirty="0" smtClean="0"/>
-              <a:t> новизна</a:t>
+              <a:rPr lang="uk-UA" dirty="0" smtClean="0"/>
+              <a:t>Суть запропонованого методу</a:t>
             </a:r>
             <a:endParaRPr lang="ru-RU" dirty="0"/>
           </a:p>
@@ -4498,23 +6799,119 @@
         </p:nvSpPr>
         <p:spPr/>
         <p:txBody>
-          <a:bodyPr/>
-          <a:lstStyle/>
-          <a:p>
-            <a:endParaRPr lang="ru-RU"/>
+          <a:bodyPr>
+            <a:normAutofit lnSpcReduction="10000"/>
+          </a:bodyPr>
+          <a:lstStyle/>
+          <a:p>
+            <a:r>
+              <a:rPr lang="ru-RU" dirty="0" err="1" smtClean="0"/>
+              <a:t>Позбутися</a:t>
+            </a:r>
+            <a:r>
+              <a:rPr lang="ru-RU" dirty="0" smtClean="0"/>
+              <a:t> </a:t>
+            </a:r>
+            <a:r>
+              <a:rPr lang="ru-RU" dirty="0" err="1" smtClean="0"/>
+              <a:t>пунктуації</a:t>
+            </a:r>
+            <a:r>
+              <a:rPr lang="ru-RU" dirty="0" smtClean="0"/>
+              <a:t> і </a:t>
+            </a:r>
+            <a:r>
+              <a:rPr lang="ru-RU" dirty="0" err="1" smtClean="0"/>
+              <a:t>виділити</a:t>
+            </a:r>
+            <a:r>
+              <a:rPr lang="ru-RU" dirty="0" smtClean="0"/>
+              <a:t> слова з </a:t>
+            </a:r>
+            <a:r>
+              <a:rPr lang="ru-RU" dirty="0" err="1" smtClean="0"/>
+              <a:t>відгуку</a:t>
+            </a:r>
+            <a:endParaRPr lang="ru-RU" dirty="0" smtClean="0"/>
+          </a:p>
+          <a:p>
+            <a:r>
+              <a:rPr lang="ru-RU" dirty="0" smtClean="0"/>
+              <a:t>За </a:t>
+            </a:r>
+            <a:r>
+              <a:rPr lang="ru-RU" dirty="0" err="1" smtClean="0"/>
+              <a:t>допомогою</a:t>
+            </a:r>
+            <a:r>
+              <a:rPr lang="ru-RU" dirty="0" smtClean="0"/>
+              <a:t> </a:t>
+            </a:r>
+            <a:r>
+              <a:rPr lang="en-US" dirty="0" smtClean="0"/>
+              <a:t>POS </a:t>
+            </a:r>
+            <a:r>
+              <a:rPr lang="uk-UA" dirty="0" smtClean="0"/>
+              <a:t>тагера виділити частини мови</a:t>
+            </a:r>
+          </a:p>
+          <a:p>
+            <a:r>
+              <a:rPr lang="uk-UA" dirty="0" smtClean="0"/>
+              <a:t>Користуючись отриманою інформацією, можна застосувати лематизатор і виділити основи слів</a:t>
+            </a:r>
+            <a:endParaRPr lang="en-US" dirty="0" smtClean="0"/>
+          </a:p>
+          <a:p>
+            <a:r>
+              <a:rPr lang="ru-RU" dirty="0" err="1"/>
+              <a:t>Відфільтрувати</a:t>
+            </a:r>
+            <a:r>
+              <a:rPr lang="ru-RU" dirty="0"/>
+              <a:t> СТОП-слова (</a:t>
+            </a:r>
+            <a:r>
+              <a:rPr lang="ru-RU" dirty="0" err="1"/>
+              <a:t>наприклад</a:t>
+            </a:r>
+            <a:r>
+              <a:rPr lang="ru-RU" dirty="0"/>
+              <a:t> </a:t>
+            </a:r>
+            <a:r>
+              <a:rPr lang="ru-RU" dirty="0" err="1"/>
+              <a:t>займеники</a:t>
+            </a:r>
+            <a:r>
+              <a:rPr lang="ru-RU" dirty="0"/>
+              <a:t>)</a:t>
+            </a:r>
+            <a:endParaRPr lang="uk-UA" dirty="0"/>
+          </a:p>
+          <a:p>
+            <a:endParaRPr lang="uk-UA" dirty="0" smtClean="0"/>
           </a:p>
         </p:txBody>
       </p:sp>
     </p:spTree>
     <p:extLst>
       <p:ext uri="{BB962C8B-B14F-4D97-AF65-F5344CB8AC3E}">
-        <p14:creationId xmlns:p14="http://schemas.microsoft.com/office/powerpoint/2010/main" val="326433767"/>
+        <p14:creationId xmlns:p14="http://schemas.microsoft.com/office/powerpoint/2010/main" val="3218890233"/>
       </p:ext>
     </p:extLst>
   </p:cSld>
   <p:clrMapOvr>
     <a:masterClrMapping/>
   </p:clrMapOvr>
+  <p:timing>
+    <p:tnLst>
+      <p:par>
+        <p:cTn xmlns:p14="http://schemas.microsoft.com/office/powerpoint/2010/main" id="1" dur="indefinite" restart="never" nodeType="tmRoot"/>
+      </p:par>
+    </p:tnLst>
+  </p:timing>
 </p:sld>
 </file>
 
@@ -4547,54 +6944,102 @@
         </p:nvSpPr>
         <p:spPr/>
         <p:txBody>
+          <a:bodyPr/>
+          <a:lstStyle/>
+          <a:p>
+            <a:r>
+              <a:rPr lang="uk-UA" dirty="0"/>
+              <a:t>Суть запропонованого </a:t>
+            </a:r>
+            <a:r>
+              <a:rPr lang="uk-UA" dirty="0" smtClean="0"/>
+              <a:t>методу</a:t>
+            </a:r>
+            <a:endParaRPr lang="ru-RU" dirty="0"/>
+          </a:p>
+        </p:txBody>
+      </p:sp>
+      <p:sp>
+        <p:nvSpPr>
+          <p:cNvPr id="3" name="Содержимое 2"/>
+          <p:cNvSpPr>
+            <a:spLocks noGrp="1"/>
+          </p:cNvSpPr>
+          <p:nvPr>
+            <p:ph idx="1"/>
+          </p:nvPr>
+        </p:nvSpPr>
+        <p:spPr/>
+        <p:txBody>
           <a:bodyPr>
-            <a:normAutofit fontScale="90000"/>
+            <a:normAutofit/>
           </a:bodyPr>
           <a:lstStyle/>
           <a:p>
             <a:r>
-              <a:rPr lang="ru-RU" dirty="0" smtClean="0"/>
-              <a:t>Практична </a:t>
-            </a:r>
-            <a:r>
-              <a:rPr lang="ru-RU" dirty="0" err="1" smtClean="0"/>
-              <a:t>значимість</a:t>
+              <a:rPr lang="uk-UA" dirty="0" smtClean="0"/>
+              <a:t>Проаналізувати </a:t>
+            </a:r>
+            <a:r>
+              <a:rPr lang="uk-UA" dirty="0"/>
+              <a:t>наявніть заперечень і слова, які підпадають під заперечення трансформувати в </a:t>
+            </a:r>
+            <a:r>
+              <a:rPr lang="en-US" dirty="0"/>
+              <a:t>“NOT_</a:t>
+            </a:r>
+            <a:r>
+              <a:rPr lang="uk-UA" dirty="0"/>
+              <a:t>слово</a:t>
+            </a:r>
+            <a:r>
+              <a:rPr lang="uk-UA" dirty="0" smtClean="0"/>
+              <a:t>”</a:t>
+            </a:r>
+          </a:p>
+          <a:p>
+            <a:r>
+              <a:rPr lang="ru-RU" dirty="0" err="1" smtClean="0"/>
+              <a:t>Вибрати</a:t>
             </a:r>
             <a:r>
               <a:rPr lang="ru-RU" dirty="0" smtClean="0"/>
               <a:t> </a:t>
             </a:r>
             <a:r>
-              <a:rPr lang="ru-RU" dirty="0" err="1" smtClean="0"/>
-              <a:t>результатів</a:t>
+              <a:rPr lang="en-US" dirty="0" smtClean="0"/>
+              <a:t>n </a:t>
+            </a:r>
+            <a:r>
+              <a:rPr lang="uk-UA" dirty="0" smtClean="0"/>
+              <a:t>найбільш вживаних слів і кожен відгук представити у вигляді вектору кількості входжень цих слів або бульового вектору входження</a:t>
+            </a:r>
+            <a:endParaRPr lang="en-US" dirty="0" smtClean="0"/>
+          </a:p>
+          <a:p>
+            <a:r>
+              <a:rPr lang="ru-RU" dirty="0" err="1"/>
+              <a:t>Врахувати</a:t>
+            </a:r>
+            <a:r>
+              <a:rPr lang="ru-RU" dirty="0"/>
+              <a:t> </a:t>
+            </a:r>
+            <a:r>
+              <a:rPr lang="ru-RU" dirty="0" err="1"/>
+              <a:t>емотикони</a:t>
             </a:r>
             <a:endParaRPr lang="ru-RU" dirty="0"/>
           </a:p>
-        </p:txBody>
-      </p:sp>
-      <p:sp>
-        <p:nvSpPr>
-          <p:cNvPr id="3" name="Содержимое 2"/>
-          <p:cNvSpPr>
-            <a:spLocks noGrp="1"/>
-          </p:cNvSpPr>
-          <p:nvPr>
-            <p:ph idx="1"/>
-          </p:nvPr>
-        </p:nvSpPr>
-        <p:spPr/>
-        <p:txBody>
-          <a:bodyPr/>
-          <a:lstStyle/>
-          <a:p>
-            <a:endParaRPr lang="ru-RU"/>
+          <a:p>
+            <a:endParaRPr lang="ru-RU" dirty="0"/>
           </a:p>
         </p:txBody>
       </p:sp>
     </p:spTree>
     <p:extLst>
       <p:ext uri="{BB962C8B-B14F-4D97-AF65-F5344CB8AC3E}">
-        <p14:creationId xmlns:p14="http://schemas.microsoft.com/office/powerpoint/2010/main" val="2818727489"/>
+        <p14:creationId xmlns:p14="http://schemas.microsoft.com/office/powerpoint/2010/main" val="1358697067"/>
       </p:ext>
     </p:extLst>
   </p:cSld>

</xml_diff>